<commit_message>
New Grid Layout for programming languages in testing - hebrew version is now complete including mobile!
</commit_message>
<xml_diff>
--- a/images/advance_css_area_help_source/programming-lang-info layout plan.pptx
+++ b/images/advance_css_area_help_source/programming-lang-info layout plan.pptx
@@ -262,7 +262,7 @@
           <a:p>
             <a:fld id="{974179F0-452B-409F-AA1D-33E756526DF6}" type="datetimeFigureOut">
               <a:rPr lang="he-IL" smtClean="0"/>
-              <a:t>י"ח/תשרי/תשפ"ה</a:t>
+              <a:t>כ'/תשרי/תשפ"ה</a:t>
             </a:fld>
             <a:endParaRPr lang="he-IL"/>
           </a:p>
@@ -460,7 +460,7 @@
           <a:p>
             <a:fld id="{974179F0-452B-409F-AA1D-33E756526DF6}" type="datetimeFigureOut">
               <a:rPr lang="he-IL" smtClean="0"/>
-              <a:t>י"ח/תשרי/תשפ"ה</a:t>
+              <a:t>כ'/תשרי/תשפ"ה</a:t>
             </a:fld>
             <a:endParaRPr lang="he-IL"/>
           </a:p>
@@ -668,7 +668,7 @@
           <a:p>
             <a:fld id="{974179F0-452B-409F-AA1D-33E756526DF6}" type="datetimeFigureOut">
               <a:rPr lang="he-IL" smtClean="0"/>
-              <a:t>י"ח/תשרי/תשפ"ה</a:t>
+              <a:t>כ'/תשרי/תשפ"ה</a:t>
             </a:fld>
             <a:endParaRPr lang="he-IL"/>
           </a:p>
@@ -866,7 +866,7 @@
           <a:p>
             <a:fld id="{974179F0-452B-409F-AA1D-33E756526DF6}" type="datetimeFigureOut">
               <a:rPr lang="he-IL" smtClean="0"/>
-              <a:t>י"ח/תשרי/תשפ"ה</a:t>
+              <a:t>כ'/תשרי/תשפ"ה</a:t>
             </a:fld>
             <a:endParaRPr lang="he-IL"/>
           </a:p>
@@ -1141,7 +1141,7 @@
           <a:p>
             <a:fld id="{974179F0-452B-409F-AA1D-33E756526DF6}" type="datetimeFigureOut">
               <a:rPr lang="he-IL" smtClean="0"/>
-              <a:t>י"ח/תשרי/תשפ"ה</a:t>
+              <a:t>כ'/תשרי/תשפ"ה</a:t>
             </a:fld>
             <a:endParaRPr lang="he-IL"/>
           </a:p>
@@ -1406,7 +1406,7 @@
           <a:p>
             <a:fld id="{974179F0-452B-409F-AA1D-33E756526DF6}" type="datetimeFigureOut">
               <a:rPr lang="he-IL" smtClean="0"/>
-              <a:t>י"ח/תשרי/תשפ"ה</a:t>
+              <a:t>כ'/תשרי/תשפ"ה</a:t>
             </a:fld>
             <a:endParaRPr lang="he-IL"/>
           </a:p>
@@ -1818,7 +1818,7 @@
           <a:p>
             <a:fld id="{974179F0-452B-409F-AA1D-33E756526DF6}" type="datetimeFigureOut">
               <a:rPr lang="he-IL" smtClean="0"/>
-              <a:t>י"ח/תשרי/תשפ"ה</a:t>
+              <a:t>כ'/תשרי/תשפ"ה</a:t>
             </a:fld>
             <a:endParaRPr lang="he-IL"/>
           </a:p>
@@ -1959,7 +1959,7 @@
           <a:p>
             <a:fld id="{974179F0-452B-409F-AA1D-33E756526DF6}" type="datetimeFigureOut">
               <a:rPr lang="he-IL" smtClean="0"/>
-              <a:t>י"ח/תשרי/תשפ"ה</a:t>
+              <a:t>כ'/תשרי/תשפ"ה</a:t>
             </a:fld>
             <a:endParaRPr lang="he-IL"/>
           </a:p>
@@ -2072,7 +2072,7 @@
           <a:p>
             <a:fld id="{974179F0-452B-409F-AA1D-33E756526DF6}" type="datetimeFigureOut">
               <a:rPr lang="he-IL" smtClean="0"/>
-              <a:t>י"ח/תשרי/תשפ"ה</a:t>
+              <a:t>כ'/תשרי/תשפ"ה</a:t>
             </a:fld>
             <a:endParaRPr lang="he-IL"/>
           </a:p>
@@ -2383,7 +2383,7 @@
           <a:p>
             <a:fld id="{974179F0-452B-409F-AA1D-33E756526DF6}" type="datetimeFigureOut">
               <a:rPr lang="he-IL" smtClean="0"/>
-              <a:t>י"ח/תשרי/תשפ"ה</a:t>
+              <a:t>כ'/תשרי/תשפ"ה</a:t>
             </a:fld>
             <a:endParaRPr lang="he-IL"/>
           </a:p>
@@ -2671,7 +2671,7 @@
           <a:p>
             <a:fld id="{974179F0-452B-409F-AA1D-33E756526DF6}" type="datetimeFigureOut">
               <a:rPr lang="he-IL" smtClean="0"/>
-              <a:t>י"ח/תשרי/תשפ"ה</a:t>
+              <a:t>כ'/תשרי/תשפ"ה</a:t>
             </a:fld>
             <a:endParaRPr lang="he-IL"/>
           </a:p>
@@ -2912,7 +2912,7 @@
           <a:p>
             <a:fld id="{974179F0-452B-409F-AA1D-33E756526DF6}" type="datetimeFigureOut">
               <a:rPr lang="he-IL" smtClean="0"/>
-              <a:t>י"ח/תשרי/תשפ"ה</a:t>
+              <a:t>כ'/תשרי/תשפ"ה</a:t>
             </a:fld>
             <a:endParaRPr lang="he-IL"/>
           </a:p>
@@ -3344,14 +3344,14 @@
           <p:nvPr>
             <p:extLst>
               <p:ext uri="{D42A27DB-BD31-4B8C-83A1-F6EECF244321}">
-                <p14:modId xmlns:p14="http://schemas.microsoft.com/office/powerpoint/2010/main" val="1995058516"/>
+                <p14:modId xmlns:p14="http://schemas.microsoft.com/office/powerpoint/2010/main" val="2606728318"/>
               </p:ext>
             </p:extLst>
           </p:nvPr>
         </p:nvGraphicFramePr>
         <p:xfrm>
-          <a:off x="725488" y="1839593"/>
-          <a:ext cx="10741024" cy="2646681"/>
+          <a:off x="2339343" y="2456298"/>
+          <a:ext cx="9206592" cy="1945404"/>
         </p:xfrm>
         <a:graphic>
           <a:graphicData uri="http://schemas.openxmlformats.org/drawingml/2006/table">
@@ -3402,202 +3402,69 @@
                     </a:ext>
                   </a:extLst>
                 </a:gridCol>
-                <a:gridCol w="1534432">
-                  <a:extLst>
-                    <a:ext uri="{9D8B030D-6E8A-4147-A177-3AD203B41FA5}">
-                      <a16:colId xmlns:a16="http://schemas.microsoft.com/office/drawing/2014/main" val="2543996263"/>
-                    </a:ext>
-                  </a:extLst>
-                </a:gridCol>
               </a:tblGrid>
-              <a:tr h="701277">
-                <a:tc>
-                  <a:txBody>
-                    <a:bodyPr/>
-                    <a:lstStyle/>
-                    <a:p>
-                      <a:pPr algn="ctr" rtl="1"/>
-                      <a:r>
-                        <a:rPr lang="en-US" dirty="0"/>
-                        <a:t>6</a:t>
-                      </a:r>
-                      <a:endParaRPr lang="he-IL" dirty="0"/>
-                    </a:p>
-                  </a:txBody>
-                  <a:tcPr anchor="ctr"/>
-                </a:tc>
-                <a:tc>
-                  <a:txBody>
-                    <a:bodyPr/>
-                    <a:lstStyle/>
-                    <a:p>
-                      <a:pPr algn="ctr" rtl="1"/>
-                      <a:r>
-                        <a:rPr lang="en-US" dirty="0"/>
-                        <a:t>5</a:t>
-                      </a:r>
-                      <a:endParaRPr lang="he-IL" dirty="0"/>
-                    </a:p>
-                  </a:txBody>
-                  <a:tcPr anchor="ctr"/>
-                </a:tc>
-                <a:tc>
-                  <a:txBody>
-                    <a:bodyPr/>
-                    <a:lstStyle/>
-                    <a:p>
-                      <a:pPr algn="ctr" rtl="1"/>
-                      <a:r>
-                        <a:rPr lang="en-US" dirty="0"/>
-                        <a:t>4</a:t>
-                      </a:r>
-                      <a:endParaRPr lang="he-IL" dirty="0"/>
-                    </a:p>
-                  </a:txBody>
-                  <a:tcPr anchor="ctr"/>
-                </a:tc>
-                <a:tc>
-                  <a:txBody>
-                    <a:bodyPr/>
-                    <a:lstStyle/>
-                    <a:p>
-                      <a:pPr algn="ctr" rtl="1"/>
-                      <a:r>
-                        <a:rPr lang="en-US" dirty="0"/>
-                        <a:t>3</a:t>
-                      </a:r>
-                      <a:endParaRPr lang="he-IL" dirty="0"/>
-                    </a:p>
-                  </a:txBody>
-                  <a:tcPr anchor="ctr"/>
-                </a:tc>
-                <a:tc>
-                  <a:txBody>
-                    <a:bodyPr/>
-                    <a:lstStyle/>
-                    <a:p>
-                      <a:pPr algn="ctr" rtl="1"/>
-                      <a:r>
-                        <a:rPr lang="en-US" dirty="0"/>
-                        <a:t>2</a:t>
-                      </a:r>
-                      <a:endParaRPr lang="he-IL" dirty="0"/>
-                    </a:p>
-                  </a:txBody>
-                  <a:tcPr anchor="ctr"/>
-                </a:tc>
-                <a:tc>
-                  <a:txBody>
-                    <a:bodyPr/>
-                    <a:lstStyle/>
-                    <a:p>
-                      <a:pPr algn="ctr" rtl="1"/>
-                      <a:r>
-                        <a:rPr lang="en-US" dirty="0"/>
-                        <a:t>1</a:t>
-                      </a:r>
-                      <a:endParaRPr lang="he-IL" dirty="0"/>
-                    </a:p>
-                  </a:txBody>
-                  <a:tcPr anchor="ctr"/>
-                </a:tc>
-                <a:tc>
-                  <a:txBody>
-                    <a:bodyPr/>
-                    <a:lstStyle/>
-                    <a:p>
-                      <a:pPr algn="ctr" rtl="1"/>
-                      <a:r>
-                        <a:rPr lang="en-US" noProof="0" dirty="0"/>
-                        <a:t>Hebrew (Default)</a:t>
-                      </a:r>
-                    </a:p>
-                  </a:txBody>
-                  <a:tcPr anchor="ctr"/>
-                </a:tc>
-                <a:extLst>
-                  <a:ext uri="{0D108BD9-81ED-4DB2-BD59-A6C34878D82A}">
-                    <a16:rowId xmlns:a16="http://schemas.microsoft.com/office/drawing/2014/main" val="157702110"/>
-                  </a:ext>
-                </a:extLst>
-              </a:tr>
               <a:tr h="411636">
-                <a:tc gridSpan="6">
-                  <a:txBody>
-                    <a:bodyPr/>
-                    <a:lstStyle/>
-                    <a:p>
-                      <a:pPr algn="ctr" rtl="1"/>
-                      <a:endParaRPr lang="he-IL" dirty="0"/>
-                    </a:p>
-                  </a:txBody>
-                  <a:tcPr anchor="ctr"/>
-                </a:tc>
-                <a:tc hMerge="1">
-                  <a:txBody>
-                    <a:bodyPr/>
-                    <a:lstStyle/>
-                    <a:p>
-                      <a:pPr rtl="1"/>
-                      <a:endParaRPr lang="he-IL" dirty="0"/>
-                    </a:p>
-                  </a:txBody>
-                  <a:tcPr anchor="ctr"/>
-                </a:tc>
-                <a:tc hMerge="1">
-                  <a:txBody>
-                    <a:bodyPr/>
-                    <a:lstStyle/>
-                    <a:p>
-                      <a:pPr rtl="1"/>
-                      <a:endParaRPr lang="he-IL" dirty="0"/>
-                    </a:p>
-                  </a:txBody>
-                  <a:tcPr anchor="ctr"/>
-                </a:tc>
-                <a:tc hMerge="1">
-                  <a:txBody>
-                    <a:bodyPr/>
-                    <a:lstStyle/>
-                    <a:p>
-                      <a:pPr rtl="1"/>
-                      <a:endParaRPr lang="he-IL" dirty="0"/>
-                    </a:p>
-                  </a:txBody>
-                  <a:tcPr anchor="ctr"/>
-                </a:tc>
-                <a:tc hMerge="1">
-                  <a:txBody>
-                    <a:bodyPr/>
-                    <a:lstStyle/>
-                    <a:p>
-                      <a:pPr rtl="1"/>
-                      <a:endParaRPr lang="he-IL" dirty="0"/>
-                    </a:p>
-                  </a:txBody>
-                  <a:tcPr anchor="ctr"/>
-                </a:tc>
-                <a:tc hMerge="1">
-                  <a:txBody>
-                    <a:bodyPr/>
-                    <a:lstStyle/>
-                    <a:p>
-                      <a:pPr rtl="1"/>
-                      <a:endParaRPr lang="he-IL" dirty="0"/>
-                    </a:p>
-                  </a:txBody>
-                  <a:tcPr anchor="ctr"/>
-                </a:tc>
-                <a:tc>
-                  <a:txBody>
-                    <a:bodyPr/>
-                    <a:lstStyle/>
-                    <a:p>
-                      <a:pPr algn="ctr" rtl="1"/>
-                      <a:r>
-                        <a:rPr lang="en-US" dirty="0"/>
-                        <a:t>1</a:t>
-                      </a:r>
+                <a:tc>
+                  <a:txBody>
+                    <a:bodyPr/>
+                    <a:lstStyle/>
+                    <a:p>
+                      <a:pPr algn="ctr" rtl="1"/>
+                      <a:endParaRPr lang="he-IL" dirty="0"/>
+                    </a:p>
+                  </a:txBody>
+                  <a:tcPr anchor="ctr"/>
+                </a:tc>
+                <a:tc>
+                  <a:txBody>
+                    <a:bodyPr/>
+                    <a:lstStyle/>
+                    <a:p>
+                      <a:pPr algn="ctr" rtl="1"/>
+                      <a:endParaRPr lang="he-IL" dirty="0"/>
+                    </a:p>
+                  </a:txBody>
+                  <a:tcPr anchor="ctr"/>
+                </a:tc>
+                <a:tc>
+                  <a:txBody>
+                    <a:bodyPr/>
+                    <a:lstStyle/>
+                    <a:p>
+                      <a:pPr algn="ctr" rtl="1"/>
+                      <a:endParaRPr lang="he-IL" dirty="0"/>
+                    </a:p>
+                  </a:txBody>
+                  <a:tcPr anchor="ctr"/>
+                </a:tc>
+                <a:tc>
+                  <a:txBody>
+                    <a:bodyPr/>
+                    <a:lstStyle/>
+                    <a:p>
+                      <a:pPr algn="ctr" rtl="1"/>
+                      <a:endParaRPr lang="he-IL" dirty="0"/>
+                    </a:p>
+                  </a:txBody>
+                  <a:tcPr anchor="ctr"/>
+                </a:tc>
+                <a:tc>
+                  <a:txBody>
+                    <a:bodyPr/>
+                    <a:lstStyle/>
+                    <a:p>
+                      <a:pPr algn="ctr" rtl="1"/>
+                      <a:endParaRPr lang="he-IL" dirty="0"/>
+                    </a:p>
+                  </a:txBody>
+                  <a:tcPr anchor="ctr"/>
+                </a:tc>
+                <a:tc>
+                  <a:txBody>
+                    <a:bodyPr/>
+                    <a:lstStyle/>
+                    <a:p>
+                      <a:pPr algn="ctr" rtl="1"/>
                       <a:endParaRPr lang="he-IL" dirty="0"/>
                     </a:p>
                   </a:txBody>
@@ -3609,8 +3476,8 @@
                   </a:ext>
                 </a:extLst>
               </a:tr>
-              <a:tr h="411636">
-                <a:tc rowSpan="2">
+              <a:tr h="561066">
+                <a:tc>
                   <a:txBody>
                     <a:bodyPr/>
                     <a:lstStyle/>
@@ -3685,27 +3552,12 @@
                   </a:txBody>
                   <a:tcPr anchor="ctr"/>
                 </a:tc>
-                <a:tc rowSpan="2">
-                  <a:txBody>
-                    <a:bodyPr/>
-                    <a:lstStyle/>
-                    <a:p>
-                      <a:pPr algn="ctr" rtl="1"/>
-                      <a:endParaRPr lang="he-IL" dirty="0"/>
-                    </a:p>
-                  </a:txBody>
-                  <a:tcPr anchor="ctr"/>
-                </a:tc>
-                <a:tc>
-                  <a:txBody>
-                    <a:bodyPr/>
-                    <a:lstStyle/>
-                    <a:p>
-                      <a:pPr algn="ctr" rtl="1"/>
-                      <a:r>
-                        <a:rPr lang="en-US" dirty="0"/>
-                        <a:t>2</a:t>
-                      </a:r>
+                <a:tc>
+                  <a:txBody>
+                    <a:bodyPr/>
+                    <a:lstStyle/>
+                    <a:p>
+                      <a:pPr algn="ctr" rtl="1"/>
                       <a:endParaRPr lang="he-IL" dirty="0"/>
                     </a:p>
                   </a:txBody>
@@ -3717,29 +3569,29 @@
                   </a:ext>
                 </a:extLst>
               </a:tr>
-              <a:tr h="710496">
+              <a:tr h="561066">
+                <a:tc>
+                  <a:txBody>
+                    <a:bodyPr/>
+                    <a:lstStyle/>
+                    <a:p>
+                      <a:pPr algn="ctr" rtl="1"/>
+                      <a:endParaRPr lang="he-IL" dirty="0"/>
+                    </a:p>
+                  </a:txBody>
+                  <a:tcPr anchor="ctr"/>
+                </a:tc>
                 <a:tc vMerge="1">
                   <a:txBody>
                     <a:bodyPr/>
                     <a:lstStyle/>
                     <a:p>
-                      <a:pPr algn="ctr" rtl="1"/>
-                      <a:endParaRPr lang="he-IL" dirty="0"/>
+                      <a:pPr rtl="1"/>
+                      <a:endParaRPr lang="he-IL"/>
                     </a:p>
                   </a:txBody>
                   <a:tcPr/>
                 </a:tc>
-                <a:tc vMerge="1">
-                  <a:txBody>
-                    <a:bodyPr/>
-                    <a:lstStyle/>
-                    <a:p>
-                      <a:pPr algn="ctr" rtl="1"/>
-                      <a:endParaRPr lang="he-IL" dirty="0"/>
-                    </a:p>
-                  </a:txBody>
-                  <a:tcPr/>
-                </a:tc>
                 <a:tc>
                   <a:txBody>
                     <a:bodyPr/>
@@ -3747,10 +3599,10 @@
                     <a:p>
                       <a:pPr algn="ctr" rtl="1"/>
                       <a:r>
-                        <a:rPr lang="en-US" dirty="0"/>
+                        <a:rPr lang="en-US"/>
                         <a:t>p</a:t>
                       </a:r>
-                      <a:endParaRPr lang="he-IL" dirty="0"/>
+                      <a:endParaRPr lang="he-IL"/>
                     </a:p>
                   </a:txBody>
                   <a:tcPr anchor="ctr"/>
@@ -3762,10 +3614,10 @@
                     <a:p>
                       <a:pPr algn="ctr" rtl="1"/>
                       <a:r>
-                        <a:rPr lang="en-US" dirty="0"/>
+                        <a:rPr lang="en-US"/>
                         <a:t>experience</a:t>
                       </a:r>
-                      <a:endParaRPr lang="he-IL" dirty="0"/>
+                      <a:endParaRPr lang="he-IL"/>
                     </a:p>
                   </a:txBody>
                   <a:tcPr anchor="ctr"/>
@@ -3789,27 +3641,12 @@
                   </a:txBody>
                   <a:tcPr anchor="ctr"/>
                 </a:tc>
-                <a:tc vMerge="1">
-                  <a:txBody>
-                    <a:bodyPr/>
-                    <a:lstStyle/>
-                    <a:p>
-                      <a:pPr algn="ctr" rtl="1"/>
-                      <a:endParaRPr lang="he-IL" dirty="0"/>
-                    </a:p>
-                  </a:txBody>
-                  <a:tcPr/>
-                </a:tc>
-                <a:tc>
-                  <a:txBody>
-                    <a:bodyPr/>
-                    <a:lstStyle/>
-                    <a:p>
-                      <a:pPr algn="ctr" rtl="1"/>
-                      <a:r>
-                        <a:rPr lang="en-US" dirty="0"/>
-                        <a:t>3</a:t>
-                      </a:r>
+                <a:tc>
+                  <a:txBody>
+                    <a:bodyPr/>
+                    <a:lstStyle/>
+                    <a:p>
+                      <a:pPr algn="ctr" rtl="1"/>
                       <a:endParaRPr lang="he-IL" dirty="0"/>
                     </a:p>
                   </a:txBody>
@@ -3817,87 +3654,72 @@
                 </a:tc>
                 <a:extLst>
                   <a:ext uri="{0D108BD9-81ED-4DB2-BD59-A6C34878D82A}">
-                    <a16:rowId xmlns:a16="http://schemas.microsoft.com/office/drawing/2014/main" val="651198522"/>
+                    <a16:rowId xmlns:a16="http://schemas.microsoft.com/office/drawing/2014/main" val="1739774236"/>
                   </a:ext>
                 </a:extLst>
               </a:tr>
               <a:tr h="411636">
-                <a:tc gridSpan="6">
-                  <a:txBody>
-                    <a:bodyPr/>
-                    <a:lstStyle/>
-                    <a:p>
-                      <a:pPr algn="ctr" rtl="1"/>
-                      <a:endParaRPr lang="he-IL" dirty="0"/>
-                    </a:p>
-                  </a:txBody>
-                  <a:tcPr anchor="ctr"/>
-                </a:tc>
-                <a:tc hMerge="1">
-                  <a:txBody>
-                    <a:bodyPr/>
-                    <a:lstStyle/>
-                    <a:p>
-                      <a:pPr rtl="1"/>
-                      <a:endParaRPr lang="he-IL"/>
-                    </a:p>
-                  </a:txBody>
-                  <a:tcPr/>
-                </a:tc>
-                <a:tc hMerge="1">
-                  <a:txBody>
-                    <a:bodyPr/>
-                    <a:lstStyle/>
-                    <a:p>
-                      <a:pPr rtl="1"/>
-                      <a:endParaRPr lang="he-IL"/>
-                    </a:p>
-                  </a:txBody>
-                  <a:tcPr/>
-                </a:tc>
-                <a:tc hMerge="1">
-                  <a:txBody>
-                    <a:bodyPr/>
-                    <a:lstStyle/>
-                    <a:p>
-                      <a:pPr rtl="1"/>
-                      <a:endParaRPr lang="he-IL"/>
-                    </a:p>
-                  </a:txBody>
-                  <a:tcPr/>
-                </a:tc>
-                <a:tc hMerge="1">
-                  <a:txBody>
-                    <a:bodyPr/>
-                    <a:lstStyle/>
-                    <a:p>
-                      <a:pPr rtl="1"/>
-                      <a:endParaRPr lang="he-IL" dirty="0"/>
-                    </a:p>
-                  </a:txBody>
-                  <a:tcPr/>
-                </a:tc>
-                <a:tc hMerge="1">
-                  <a:txBody>
-                    <a:bodyPr/>
-                    <a:lstStyle/>
-                    <a:p>
-                      <a:pPr rtl="1"/>
-                      <a:endParaRPr lang="he-IL" dirty="0"/>
-                    </a:p>
-                  </a:txBody>
-                  <a:tcPr/>
-                </a:tc>
-                <a:tc>
-                  <a:txBody>
-                    <a:bodyPr/>
-                    <a:lstStyle/>
-                    <a:p>
-                      <a:pPr algn="ctr" rtl="1"/>
-                      <a:r>
-                        <a:rPr lang="en-US" dirty="0"/>
-                        <a:t>4</a:t>
-                      </a:r>
+                <a:tc>
+                  <a:txBody>
+                    <a:bodyPr/>
+                    <a:lstStyle/>
+                    <a:p>
+                      <a:pPr algn="ctr" rtl="1"/>
+                      <a:endParaRPr lang="he-IL" dirty="0"/>
+                    </a:p>
+                  </a:txBody>
+                  <a:tcPr anchor="ctr"/>
+                </a:tc>
+                <a:tc>
+                  <a:txBody>
+                    <a:bodyPr/>
+                    <a:lstStyle/>
+                    <a:p>
+                      <a:pPr algn="ctr" rtl="1"/>
+                      <a:endParaRPr lang="he-IL" dirty="0"/>
+                    </a:p>
+                  </a:txBody>
+                  <a:tcPr anchor="ctr"/>
+                </a:tc>
+                <a:tc>
+                  <a:txBody>
+                    <a:bodyPr/>
+                    <a:lstStyle/>
+                    <a:p>
+                      <a:pPr algn="ctr" rtl="1"/>
+                      <a:endParaRPr lang="he-IL" dirty="0"/>
+                    </a:p>
+                  </a:txBody>
+                  <a:tcPr anchor="ctr"/>
+                </a:tc>
+                <a:tc>
+                  <a:txBody>
+                    <a:bodyPr/>
+                    <a:lstStyle/>
+                    <a:p>
+                      <a:pPr algn="ctr" rtl="1"/>
+                      <a:endParaRPr lang="he-IL" dirty="0"/>
+                    </a:p>
+                  </a:txBody>
+                  <a:tcPr anchor="ctr"/>
+                </a:tc>
+                <a:tc>
+                  <a:txBody>
+                    <a:bodyPr/>
+                    <a:lstStyle/>
+                    <a:p>
+                      <a:pPr algn="ctr" rtl="1"/>
+                      <a:endParaRPr lang="he-IL" dirty="0"/>
+                    </a:p>
+                  </a:txBody>
+                  <a:tcPr anchor="ctr"/>
+                </a:tc>
+                <a:tc>
+                  <a:txBody>
+                    <a:bodyPr/>
+                    <a:lstStyle/>
+                    <a:p>
+                      <a:pPr algn="ctr" rtl="1"/>
                       <a:endParaRPr lang="he-IL" dirty="0"/>
                     </a:p>
                   </a:txBody>
@@ -3946,6 +3768,556 @@
               <a:t>Hebrew Default Version</a:t>
             </a:r>
             <a:endParaRPr lang="he-IL" sz="7000" b="1" u="sng" dirty="0"/>
+          </a:p>
+        </p:txBody>
+      </p:sp>
+      <p:sp>
+        <p:nvSpPr>
+          <p:cNvPr id="2" name="מלבן 1">
+            <a:extLst>
+              <a:ext uri="{FF2B5EF4-FFF2-40B4-BE49-F238E27FC236}">
+                <a16:creationId xmlns:a16="http://schemas.microsoft.com/office/drawing/2014/main" id="{179B7E08-52B9-BC7C-5500-908FE63D7AA6}"/>
+              </a:ext>
+            </a:extLst>
+          </p:cNvPr>
+          <p:cNvSpPr/>
+          <p:nvPr/>
+        </p:nvSpPr>
+        <p:spPr>
+          <a:xfrm>
+            <a:off x="1988819" y="2066454"/>
+            <a:ext cx="228600" cy="301752"/>
+          </a:xfrm>
+          <a:prstGeom prst="rect">
+            <a:avLst/>
+          </a:prstGeom>
+        </p:spPr>
+        <p:style>
+          <a:lnRef idx="2">
+            <a:schemeClr val="accent1">
+              <a:shade val="15000"/>
+            </a:schemeClr>
+          </a:lnRef>
+          <a:fillRef idx="1">
+            <a:schemeClr val="accent1"/>
+          </a:fillRef>
+          <a:effectRef idx="0">
+            <a:schemeClr val="accent1"/>
+          </a:effectRef>
+          <a:fontRef idx="minor">
+            <a:schemeClr val="lt1"/>
+          </a:fontRef>
+        </p:style>
+        <p:txBody>
+          <a:bodyPr rtlCol="1" anchor="ctr"/>
+          <a:lstStyle/>
+          <a:p>
+            <a:pPr algn="ctr"/>
+            <a:r>
+              <a:rPr lang="en-US" dirty="0"/>
+              <a:t>1</a:t>
+            </a:r>
+            <a:endParaRPr lang="he-IL" dirty="0"/>
+          </a:p>
+        </p:txBody>
+      </p:sp>
+      <p:sp>
+        <p:nvSpPr>
+          <p:cNvPr id="3" name="מלבן 2">
+            <a:extLst>
+              <a:ext uri="{FF2B5EF4-FFF2-40B4-BE49-F238E27FC236}">
+                <a16:creationId xmlns:a16="http://schemas.microsoft.com/office/drawing/2014/main" id="{9CFF9353-63EF-48DC-9834-2A49DFB58EE6}"/>
+              </a:ext>
+            </a:extLst>
+          </p:cNvPr>
+          <p:cNvSpPr/>
+          <p:nvPr/>
+        </p:nvSpPr>
+        <p:spPr>
+          <a:xfrm>
+            <a:off x="3733796" y="2064756"/>
+            <a:ext cx="228600" cy="301752"/>
+          </a:xfrm>
+          <a:prstGeom prst="rect">
+            <a:avLst/>
+          </a:prstGeom>
+        </p:spPr>
+        <p:style>
+          <a:lnRef idx="2">
+            <a:schemeClr val="accent1">
+              <a:shade val="15000"/>
+            </a:schemeClr>
+          </a:lnRef>
+          <a:fillRef idx="1">
+            <a:schemeClr val="accent1"/>
+          </a:fillRef>
+          <a:effectRef idx="0">
+            <a:schemeClr val="accent1"/>
+          </a:effectRef>
+          <a:fontRef idx="minor">
+            <a:schemeClr val="lt1"/>
+          </a:fontRef>
+        </p:style>
+        <p:txBody>
+          <a:bodyPr rtlCol="1" anchor="ctr"/>
+          <a:lstStyle/>
+          <a:p>
+            <a:pPr algn="ctr"/>
+            <a:r>
+              <a:rPr lang="en-US" dirty="0"/>
+              <a:t>2</a:t>
+            </a:r>
+            <a:endParaRPr lang="he-IL" dirty="0"/>
+          </a:p>
+        </p:txBody>
+      </p:sp>
+      <p:sp>
+        <p:nvSpPr>
+          <p:cNvPr id="4" name="מלבן 3">
+            <a:extLst>
+              <a:ext uri="{FF2B5EF4-FFF2-40B4-BE49-F238E27FC236}">
+                <a16:creationId xmlns:a16="http://schemas.microsoft.com/office/drawing/2014/main" id="{0EEBDBD0-9C54-FFCE-BAEF-EF8A80F58F75}"/>
+              </a:ext>
+            </a:extLst>
+          </p:cNvPr>
+          <p:cNvSpPr/>
+          <p:nvPr/>
+        </p:nvSpPr>
+        <p:spPr>
+          <a:xfrm>
+            <a:off x="9906004" y="2036570"/>
+            <a:ext cx="228600" cy="301752"/>
+          </a:xfrm>
+          <a:prstGeom prst="rect">
+            <a:avLst/>
+          </a:prstGeom>
+        </p:spPr>
+        <p:style>
+          <a:lnRef idx="2">
+            <a:schemeClr val="accent1">
+              <a:shade val="15000"/>
+            </a:schemeClr>
+          </a:lnRef>
+          <a:fillRef idx="1">
+            <a:schemeClr val="accent1"/>
+          </a:fillRef>
+          <a:effectRef idx="0">
+            <a:schemeClr val="accent1"/>
+          </a:effectRef>
+          <a:fontRef idx="minor">
+            <a:schemeClr val="lt1"/>
+          </a:fontRef>
+        </p:style>
+        <p:txBody>
+          <a:bodyPr rtlCol="1" anchor="ctr"/>
+          <a:lstStyle/>
+          <a:p>
+            <a:pPr algn="ctr"/>
+            <a:r>
+              <a:rPr lang="en-US" dirty="0"/>
+              <a:t>6</a:t>
+            </a:r>
+            <a:endParaRPr lang="he-IL" dirty="0"/>
+          </a:p>
+        </p:txBody>
+      </p:sp>
+      <p:sp>
+        <p:nvSpPr>
+          <p:cNvPr id="5" name="מלבן 4">
+            <a:extLst>
+              <a:ext uri="{FF2B5EF4-FFF2-40B4-BE49-F238E27FC236}">
+                <a16:creationId xmlns:a16="http://schemas.microsoft.com/office/drawing/2014/main" id="{F4365BA6-1D7A-9908-1D39-E6A8404F05DC}"/>
+              </a:ext>
+            </a:extLst>
+          </p:cNvPr>
+          <p:cNvSpPr/>
+          <p:nvPr/>
+        </p:nvSpPr>
+        <p:spPr>
+          <a:xfrm>
+            <a:off x="5288282" y="2066454"/>
+            <a:ext cx="228600" cy="301752"/>
+          </a:xfrm>
+          <a:prstGeom prst="rect">
+            <a:avLst/>
+          </a:prstGeom>
+        </p:spPr>
+        <p:style>
+          <a:lnRef idx="2">
+            <a:schemeClr val="accent1">
+              <a:shade val="15000"/>
+            </a:schemeClr>
+          </a:lnRef>
+          <a:fillRef idx="1">
+            <a:schemeClr val="accent1"/>
+          </a:fillRef>
+          <a:effectRef idx="0">
+            <a:schemeClr val="accent1"/>
+          </a:effectRef>
+          <a:fontRef idx="minor">
+            <a:schemeClr val="lt1"/>
+          </a:fontRef>
+        </p:style>
+        <p:txBody>
+          <a:bodyPr rtlCol="1" anchor="ctr"/>
+          <a:lstStyle/>
+          <a:p>
+            <a:pPr algn="ctr"/>
+            <a:r>
+              <a:rPr lang="en-US" dirty="0"/>
+              <a:t>3</a:t>
+            </a:r>
+            <a:endParaRPr lang="he-IL" dirty="0"/>
+          </a:p>
+        </p:txBody>
+      </p:sp>
+      <p:sp>
+        <p:nvSpPr>
+          <p:cNvPr id="6" name="מלבן 5">
+            <a:extLst>
+              <a:ext uri="{FF2B5EF4-FFF2-40B4-BE49-F238E27FC236}">
+                <a16:creationId xmlns:a16="http://schemas.microsoft.com/office/drawing/2014/main" id="{1034534A-F012-B462-3ADE-2D4736FF2858}"/>
+              </a:ext>
+            </a:extLst>
+          </p:cNvPr>
+          <p:cNvSpPr/>
+          <p:nvPr/>
+        </p:nvSpPr>
+        <p:spPr>
+          <a:xfrm>
+            <a:off x="6830570" y="2066454"/>
+            <a:ext cx="228600" cy="301752"/>
+          </a:xfrm>
+          <a:prstGeom prst="rect">
+            <a:avLst/>
+          </a:prstGeom>
+        </p:spPr>
+        <p:style>
+          <a:lnRef idx="2">
+            <a:schemeClr val="accent1">
+              <a:shade val="15000"/>
+            </a:schemeClr>
+          </a:lnRef>
+          <a:fillRef idx="1">
+            <a:schemeClr val="accent1"/>
+          </a:fillRef>
+          <a:effectRef idx="0">
+            <a:schemeClr val="accent1"/>
+          </a:effectRef>
+          <a:fontRef idx="minor">
+            <a:schemeClr val="lt1"/>
+          </a:fontRef>
+        </p:style>
+        <p:txBody>
+          <a:bodyPr rtlCol="1" anchor="ctr"/>
+          <a:lstStyle/>
+          <a:p>
+            <a:pPr algn="ctr"/>
+            <a:r>
+              <a:rPr lang="en-US" dirty="0"/>
+              <a:t>4</a:t>
+            </a:r>
+            <a:endParaRPr lang="he-IL" dirty="0"/>
+          </a:p>
+        </p:txBody>
+      </p:sp>
+      <p:sp>
+        <p:nvSpPr>
+          <p:cNvPr id="7" name="מלבן 6">
+            <a:extLst>
+              <a:ext uri="{FF2B5EF4-FFF2-40B4-BE49-F238E27FC236}">
+                <a16:creationId xmlns:a16="http://schemas.microsoft.com/office/drawing/2014/main" id="{08832B84-43FC-ABAA-F99B-18D3B91D2743}"/>
+              </a:ext>
+            </a:extLst>
+          </p:cNvPr>
+          <p:cNvSpPr/>
+          <p:nvPr/>
+        </p:nvSpPr>
+        <p:spPr>
+          <a:xfrm>
+            <a:off x="8363716" y="2044041"/>
+            <a:ext cx="228600" cy="301752"/>
+          </a:xfrm>
+          <a:prstGeom prst="rect">
+            <a:avLst/>
+          </a:prstGeom>
+        </p:spPr>
+        <p:style>
+          <a:lnRef idx="2">
+            <a:schemeClr val="accent1">
+              <a:shade val="15000"/>
+            </a:schemeClr>
+          </a:lnRef>
+          <a:fillRef idx="1">
+            <a:schemeClr val="accent1"/>
+          </a:fillRef>
+          <a:effectRef idx="0">
+            <a:schemeClr val="accent1"/>
+          </a:effectRef>
+          <a:fontRef idx="minor">
+            <a:schemeClr val="lt1"/>
+          </a:fontRef>
+        </p:style>
+        <p:txBody>
+          <a:bodyPr rtlCol="1" anchor="ctr"/>
+          <a:lstStyle/>
+          <a:p>
+            <a:pPr algn="ctr"/>
+            <a:r>
+              <a:rPr lang="en-US" dirty="0"/>
+              <a:t>5</a:t>
+            </a:r>
+            <a:endParaRPr lang="he-IL" dirty="0"/>
+          </a:p>
+        </p:txBody>
+      </p:sp>
+      <p:sp>
+        <p:nvSpPr>
+          <p:cNvPr id="8" name="מלבן 7">
+            <a:extLst>
+              <a:ext uri="{FF2B5EF4-FFF2-40B4-BE49-F238E27FC236}">
+                <a16:creationId xmlns:a16="http://schemas.microsoft.com/office/drawing/2014/main" id="{86349EF2-A658-60FC-330C-F9369C29457F}"/>
+              </a:ext>
+            </a:extLst>
+          </p:cNvPr>
+          <p:cNvSpPr/>
+          <p:nvPr/>
+        </p:nvSpPr>
+        <p:spPr>
+          <a:xfrm>
+            <a:off x="11433051" y="2058983"/>
+            <a:ext cx="228600" cy="301752"/>
+          </a:xfrm>
+          <a:prstGeom prst="rect">
+            <a:avLst/>
+          </a:prstGeom>
+        </p:spPr>
+        <p:style>
+          <a:lnRef idx="2">
+            <a:schemeClr val="accent1">
+              <a:shade val="15000"/>
+            </a:schemeClr>
+          </a:lnRef>
+          <a:fillRef idx="1">
+            <a:schemeClr val="accent1"/>
+          </a:fillRef>
+          <a:effectRef idx="0">
+            <a:schemeClr val="accent1"/>
+          </a:effectRef>
+          <a:fontRef idx="minor">
+            <a:schemeClr val="lt1"/>
+          </a:fontRef>
+        </p:style>
+        <p:txBody>
+          <a:bodyPr rtlCol="1" anchor="ctr"/>
+          <a:lstStyle/>
+          <a:p>
+            <a:pPr algn="ctr"/>
+            <a:r>
+              <a:rPr lang="en-US" dirty="0"/>
+              <a:t>7</a:t>
+            </a:r>
+            <a:endParaRPr lang="he-IL" dirty="0"/>
+          </a:p>
+        </p:txBody>
+      </p:sp>
+      <p:sp>
+        <p:nvSpPr>
+          <p:cNvPr id="22" name="מלבן 21">
+            <a:extLst>
+              <a:ext uri="{FF2B5EF4-FFF2-40B4-BE49-F238E27FC236}">
+                <a16:creationId xmlns:a16="http://schemas.microsoft.com/office/drawing/2014/main" id="{664B5499-CA1F-D6C7-27BA-4FCA5C646D40}"/>
+              </a:ext>
+            </a:extLst>
+          </p:cNvPr>
+          <p:cNvSpPr/>
+          <p:nvPr/>
+        </p:nvSpPr>
+        <p:spPr>
+          <a:xfrm>
+            <a:off x="1988819" y="2620890"/>
+            <a:ext cx="228600" cy="301752"/>
+          </a:xfrm>
+          <a:prstGeom prst="rect">
+            <a:avLst/>
+          </a:prstGeom>
+        </p:spPr>
+        <p:style>
+          <a:lnRef idx="2">
+            <a:schemeClr val="accent1">
+              <a:shade val="15000"/>
+            </a:schemeClr>
+          </a:lnRef>
+          <a:fillRef idx="1">
+            <a:schemeClr val="accent1"/>
+          </a:fillRef>
+          <a:effectRef idx="0">
+            <a:schemeClr val="accent1"/>
+          </a:effectRef>
+          <a:fontRef idx="minor">
+            <a:schemeClr val="lt1"/>
+          </a:fontRef>
+        </p:style>
+        <p:txBody>
+          <a:bodyPr rtlCol="1" anchor="ctr"/>
+          <a:lstStyle/>
+          <a:p>
+            <a:pPr algn="ctr"/>
+            <a:r>
+              <a:rPr lang="en-US" dirty="0"/>
+              <a:t>2</a:t>
+            </a:r>
+            <a:endParaRPr lang="he-IL" dirty="0"/>
+          </a:p>
+        </p:txBody>
+      </p:sp>
+      <p:sp>
+        <p:nvSpPr>
+          <p:cNvPr id="23" name="מלבן 22">
+            <a:extLst>
+              <a:ext uri="{FF2B5EF4-FFF2-40B4-BE49-F238E27FC236}">
+                <a16:creationId xmlns:a16="http://schemas.microsoft.com/office/drawing/2014/main" id="{BDC9A768-5BAF-2A0C-EFC7-ED7BC8791707}"/>
+              </a:ext>
+            </a:extLst>
+          </p:cNvPr>
+          <p:cNvSpPr/>
+          <p:nvPr/>
+        </p:nvSpPr>
+        <p:spPr>
+          <a:xfrm>
+            <a:off x="1988819" y="3160386"/>
+            <a:ext cx="228600" cy="301752"/>
+          </a:xfrm>
+          <a:prstGeom prst="rect">
+            <a:avLst/>
+          </a:prstGeom>
+        </p:spPr>
+        <p:style>
+          <a:lnRef idx="2">
+            <a:schemeClr val="accent1">
+              <a:shade val="15000"/>
+            </a:schemeClr>
+          </a:lnRef>
+          <a:fillRef idx="1">
+            <a:schemeClr val="accent1"/>
+          </a:fillRef>
+          <a:effectRef idx="0">
+            <a:schemeClr val="accent1"/>
+          </a:effectRef>
+          <a:fontRef idx="minor">
+            <a:schemeClr val="lt1"/>
+          </a:fontRef>
+        </p:style>
+        <p:txBody>
+          <a:bodyPr rtlCol="1" anchor="ctr"/>
+          <a:lstStyle/>
+          <a:p>
+            <a:pPr algn="ctr"/>
+            <a:r>
+              <a:rPr lang="en-US" dirty="0"/>
+              <a:t>3</a:t>
+            </a:r>
+            <a:endParaRPr lang="he-IL" dirty="0"/>
+          </a:p>
+        </p:txBody>
+      </p:sp>
+      <p:sp>
+        <p:nvSpPr>
+          <p:cNvPr id="24" name="מלבן 23">
+            <a:extLst>
+              <a:ext uri="{FF2B5EF4-FFF2-40B4-BE49-F238E27FC236}">
+                <a16:creationId xmlns:a16="http://schemas.microsoft.com/office/drawing/2014/main" id="{7FA953A1-8C8C-5505-018B-D112AF317E47}"/>
+              </a:ext>
+            </a:extLst>
+          </p:cNvPr>
+          <p:cNvSpPr/>
+          <p:nvPr/>
+        </p:nvSpPr>
+        <p:spPr>
+          <a:xfrm>
+            <a:off x="1988819" y="3699882"/>
+            <a:ext cx="228600" cy="301752"/>
+          </a:xfrm>
+          <a:prstGeom prst="rect">
+            <a:avLst/>
+          </a:prstGeom>
+        </p:spPr>
+        <p:style>
+          <a:lnRef idx="2">
+            <a:schemeClr val="accent1">
+              <a:shade val="15000"/>
+            </a:schemeClr>
+          </a:lnRef>
+          <a:fillRef idx="1">
+            <a:schemeClr val="accent1"/>
+          </a:fillRef>
+          <a:effectRef idx="0">
+            <a:schemeClr val="accent1"/>
+          </a:effectRef>
+          <a:fontRef idx="minor">
+            <a:schemeClr val="lt1"/>
+          </a:fontRef>
+        </p:style>
+        <p:txBody>
+          <a:bodyPr rtlCol="1" anchor="ctr"/>
+          <a:lstStyle/>
+          <a:p>
+            <a:pPr algn="ctr"/>
+            <a:r>
+              <a:rPr lang="en-US" dirty="0"/>
+              <a:t>4</a:t>
+            </a:r>
+            <a:endParaRPr lang="he-IL" dirty="0"/>
+          </a:p>
+        </p:txBody>
+      </p:sp>
+      <p:sp>
+        <p:nvSpPr>
+          <p:cNvPr id="25" name="מלבן 24">
+            <a:extLst>
+              <a:ext uri="{FF2B5EF4-FFF2-40B4-BE49-F238E27FC236}">
+                <a16:creationId xmlns:a16="http://schemas.microsoft.com/office/drawing/2014/main" id="{83470095-C756-3295-F7F1-76D0BF700576}"/>
+              </a:ext>
+            </a:extLst>
+          </p:cNvPr>
+          <p:cNvSpPr/>
+          <p:nvPr/>
+        </p:nvSpPr>
+        <p:spPr>
+          <a:xfrm>
+            <a:off x="1988819" y="4177674"/>
+            <a:ext cx="228600" cy="301752"/>
+          </a:xfrm>
+          <a:prstGeom prst="rect">
+            <a:avLst/>
+          </a:prstGeom>
+        </p:spPr>
+        <p:style>
+          <a:lnRef idx="2">
+            <a:schemeClr val="accent1">
+              <a:shade val="15000"/>
+            </a:schemeClr>
+          </a:lnRef>
+          <a:fillRef idx="1">
+            <a:schemeClr val="accent1"/>
+          </a:fillRef>
+          <a:effectRef idx="0">
+            <a:schemeClr val="accent1"/>
+          </a:effectRef>
+          <a:fontRef idx="minor">
+            <a:schemeClr val="lt1"/>
+          </a:fontRef>
+        </p:style>
+        <p:txBody>
+          <a:bodyPr rtlCol="1" anchor="ctr"/>
+          <a:lstStyle/>
+          <a:p>
+            <a:pPr algn="ctr"/>
+            <a:r>
+              <a:rPr lang="en-US" dirty="0"/>
+              <a:t>5</a:t>
+            </a:r>
+            <a:endParaRPr lang="he-IL" dirty="0"/>
           </a:p>
         </p:txBody>
       </p:sp>
@@ -4763,14 +5135,14 @@
           <p:nvPr>
             <p:extLst>
               <p:ext uri="{D42A27DB-BD31-4B8C-83A1-F6EECF244321}">
-                <p14:modId xmlns:p14="http://schemas.microsoft.com/office/powerpoint/2010/main" val="1529504596"/>
+                <p14:modId xmlns:p14="http://schemas.microsoft.com/office/powerpoint/2010/main" val="2256201357"/>
               </p:ext>
             </p:extLst>
           </p:nvPr>
         </p:nvGraphicFramePr>
         <p:xfrm>
-          <a:off x="2032000" y="1760220"/>
-          <a:ext cx="8128000" cy="3881120"/>
+          <a:off x="1976120" y="2281428"/>
+          <a:ext cx="7735824" cy="4128520"/>
         </p:xfrm>
         <a:graphic>
           <a:graphicData uri="http://schemas.openxmlformats.org/drawingml/2006/table">
@@ -4779,186 +5151,75 @@
                 <a:tableStyleId>{BC89EF96-8CEA-46FF-86C4-4CE0E7609802}</a:tableStyleId>
               </a:tblPr>
               <a:tblGrid>
-                <a:gridCol w="1625600">
+                <a:gridCol w="1933956">
                   <a:extLst>
                     <a:ext uri="{9D8B030D-6E8A-4147-A177-3AD203B41FA5}">
                       <a16:colId xmlns:a16="http://schemas.microsoft.com/office/drawing/2014/main" val="3562599689"/>
                     </a:ext>
                   </a:extLst>
                 </a:gridCol>
-                <a:gridCol w="1625600">
+                <a:gridCol w="1933956">
                   <a:extLst>
                     <a:ext uri="{9D8B030D-6E8A-4147-A177-3AD203B41FA5}">
                       <a16:colId xmlns:a16="http://schemas.microsoft.com/office/drawing/2014/main" val="2390034552"/>
                     </a:ext>
                   </a:extLst>
                 </a:gridCol>
-                <a:gridCol w="1625600">
+                <a:gridCol w="1933956">
                   <a:extLst>
                     <a:ext uri="{9D8B030D-6E8A-4147-A177-3AD203B41FA5}">
                       <a16:colId xmlns:a16="http://schemas.microsoft.com/office/drawing/2014/main" val="2439500098"/>
                     </a:ext>
                   </a:extLst>
                 </a:gridCol>
-                <a:gridCol w="1625600">
+                <a:gridCol w="1933956">
                   <a:extLst>
                     <a:ext uri="{9D8B030D-6E8A-4147-A177-3AD203B41FA5}">
                       <a16:colId xmlns:a16="http://schemas.microsoft.com/office/drawing/2014/main" val="3855221628"/>
                     </a:ext>
                   </a:extLst>
                 </a:gridCol>
-                <a:gridCol w="1625600">
-                  <a:extLst>
-                    <a:ext uri="{9D8B030D-6E8A-4147-A177-3AD203B41FA5}">
-                      <a16:colId xmlns:a16="http://schemas.microsoft.com/office/drawing/2014/main" val="1311311664"/>
-                    </a:ext>
-                  </a:extLst>
-                </a:gridCol>
               </a:tblGrid>
-              <a:tr h="370840">
-                <a:tc>
-                  <a:txBody>
-                    <a:bodyPr/>
-                    <a:lstStyle/>
-                    <a:p>
-                      <a:pPr algn="ctr" rtl="1"/>
-                      <a:r>
-                        <a:rPr lang="en-US" dirty="0"/>
-                        <a:t>4</a:t>
-                      </a:r>
-                      <a:endParaRPr lang="he-IL" dirty="0"/>
-                    </a:p>
-                  </a:txBody>
-                  <a:tcPr anchor="ctr"/>
-                </a:tc>
-                <a:tc>
-                  <a:txBody>
-                    <a:bodyPr/>
-                    <a:lstStyle/>
-                    <a:p>
-                      <a:pPr algn="ctr" rtl="1"/>
-                      <a:r>
-                        <a:rPr lang="en-US" dirty="0"/>
-                        <a:t>3</a:t>
-                      </a:r>
-                      <a:endParaRPr lang="he-IL" dirty="0"/>
-                    </a:p>
-                  </a:txBody>
-                  <a:tcPr anchor="ctr"/>
-                </a:tc>
-                <a:tc>
-                  <a:txBody>
-                    <a:bodyPr/>
-                    <a:lstStyle/>
-                    <a:p>
-                      <a:pPr algn="ctr" rtl="1"/>
-                      <a:r>
-                        <a:rPr lang="en-US" dirty="0"/>
-                        <a:t>2</a:t>
-                      </a:r>
-                      <a:endParaRPr lang="he-IL" dirty="0"/>
-                    </a:p>
-                  </a:txBody>
-                  <a:tcPr anchor="ctr"/>
-                </a:tc>
-                <a:tc>
-                  <a:txBody>
-                    <a:bodyPr/>
-                    <a:lstStyle/>
-                    <a:p>
-                      <a:pPr algn="ctr" rtl="1"/>
-                      <a:r>
-                        <a:rPr lang="en-US" dirty="0"/>
-                        <a:t>1</a:t>
-                      </a:r>
-                      <a:endParaRPr lang="he-IL" dirty="0"/>
-                    </a:p>
-                  </a:txBody>
-                  <a:tcPr anchor="ctr"/>
-                </a:tc>
-                <a:tc>
-                  <a:txBody>
-                    <a:bodyPr/>
-                    <a:lstStyle/>
-                    <a:p>
-                      <a:pPr algn="ctr" rtl="1"/>
-                      <a:r>
-                        <a:rPr lang="en-US" dirty="0"/>
-                        <a:t>Hebrew Mobile</a:t>
-                      </a:r>
-                    </a:p>
-                    <a:p>
-                      <a:pPr algn="ctr" rtl="1"/>
-                      <a:r>
-                        <a:rPr lang="en-US" dirty="0"/>
-                        <a:t>(Default)</a:t>
-                      </a:r>
-                      <a:endParaRPr lang="he-IL" dirty="0"/>
-                    </a:p>
-                  </a:txBody>
-                  <a:tcPr anchor="ctr"/>
-                </a:tc>
-                <a:extLst>
-                  <a:ext uri="{0D108BD9-81ED-4DB2-BD59-A6C34878D82A}">
-                    <a16:rowId xmlns:a16="http://schemas.microsoft.com/office/drawing/2014/main" val="3273744787"/>
-                  </a:ext>
-                </a:extLst>
-              </a:tr>
-              <a:tr h="370840">
-                <a:tc gridSpan="4">
-                  <a:txBody>
-                    <a:bodyPr/>
-                    <a:lstStyle/>
-                    <a:p>
-                      <a:pPr algn="ctr" rtl="1"/>
-                      <a:endParaRPr lang="he-IL" dirty="0"/>
-                    </a:p>
-                  </a:txBody>
-                  <a:tcPr anchor="ctr"/>
-                </a:tc>
-                <a:tc hMerge="1">
-                  <a:txBody>
-                    <a:bodyPr/>
-                    <a:lstStyle/>
-                    <a:p>
-                      <a:pPr rtl="1"/>
-                      <a:endParaRPr lang="he-IL" dirty="0"/>
-                    </a:p>
-                  </a:txBody>
-                  <a:tcPr/>
-                </a:tc>
-                <a:tc hMerge="1">
-                  <a:txBody>
-                    <a:bodyPr/>
-                    <a:lstStyle/>
-                    <a:p>
-                      <a:pPr rtl="1"/>
-                      <a:endParaRPr lang="he-IL" dirty="0"/>
-                    </a:p>
-                  </a:txBody>
-                  <a:tcPr/>
-                </a:tc>
-                <a:tc hMerge="1">
-                  <a:txBody>
-                    <a:bodyPr/>
-                    <a:lstStyle/>
-                    <a:p>
-                      <a:pPr rtl="1"/>
-                      <a:endParaRPr lang="he-IL" dirty="0"/>
-                    </a:p>
-                  </a:txBody>
-                  <a:tcPr/>
-                </a:tc>
-                <a:tc>
-                  <a:txBody>
-                    <a:bodyPr/>
-                    <a:lstStyle/>
-                    <a:p>
-                      <a:pPr algn="ctr" rtl="1"/>
-                      <a:r>
-                        <a:rPr lang="en-US" dirty="0"/>
-                        <a:t>1</a:t>
-                      </a:r>
+              <a:tr h="516065">
+                <a:tc>
+                  <a:txBody>
+                    <a:bodyPr/>
+                    <a:lstStyle/>
+                    <a:p>
+                      <a:pPr algn="ctr" rtl="1"/>
+                      <a:endParaRPr lang="he-IL" dirty="0"/>
+                    </a:p>
+                  </a:txBody>
+                  <a:tcPr anchor="ctr"/>
+                </a:tc>
+                <a:tc>
+                  <a:txBody>
+                    <a:bodyPr/>
+                    <a:lstStyle/>
+                    <a:p>
+                      <a:pPr algn="ctr" rtl="1"/>
+                      <a:endParaRPr lang="he-IL" dirty="0"/>
+                    </a:p>
+                  </a:txBody>
+                  <a:tcPr anchor="ctr"/>
+                </a:tc>
+                <a:tc>
+                  <a:txBody>
+                    <a:bodyPr/>
+                    <a:lstStyle/>
+                    <a:p>
+                      <a:pPr algn="ctr" rtl="1"/>
+                      <a:endParaRPr lang="he-IL" dirty="0"/>
+                    </a:p>
+                  </a:txBody>
+                  <a:tcPr anchor="ctr"/>
+                </a:tc>
+                <a:tc>
+                  <a:txBody>
+                    <a:bodyPr/>
+                    <a:lstStyle/>
+                    <a:p>
+                      <a:pPr algn="ctr" rtl="1"/>
                       <a:endParaRPr lang="he-IL" dirty="0"/>
                     </a:p>
                   </a:txBody>
@@ -4970,8 +5231,8 @@
                   </a:ext>
                 </a:extLst>
               </a:tr>
-              <a:tr h="370840">
-                <a:tc rowSpan="6">
+              <a:tr h="516065">
+                <a:tc>
                   <a:txBody>
                     <a:bodyPr/>
                     <a:lstStyle/>
@@ -5012,27 +5273,12 @@
                   </a:txBody>
                   <a:tcPr anchor="ctr"/>
                 </a:tc>
-                <a:tc rowSpan="6">
-                  <a:txBody>
-                    <a:bodyPr/>
-                    <a:lstStyle/>
-                    <a:p>
-                      <a:pPr algn="ctr" rtl="1"/>
-                      <a:endParaRPr lang="he-IL" dirty="0"/>
-                    </a:p>
-                  </a:txBody>
-                  <a:tcPr anchor="ctr"/>
-                </a:tc>
-                <a:tc>
-                  <a:txBody>
-                    <a:bodyPr/>
-                    <a:lstStyle/>
-                    <a:p>
-                      <a:pPr algn="ctr" rtl="1"/>
-                      <a:r>
-                        <a:rPr lang="en-US" dirty="0"/>
-                        <a:t>2</a:t>
-                      </a:r>
+                <a:tc>
+                  <a:txBody>
+                    <a:bodyPr/>
+                    <a:lstStyle/>
+                    <a:p>
+                      <a:pPr algn="ctr" rtl="1"/>
                       <a:endParaRPr lang="he-IL" dirty="0"/>
                     </a:p>
                   </a:txBody>
@@ -5044,17 +5290,17 @@
                   </a:ext>
                 </a:extLst>
               </a:tr>
-              <a:tr h="370840">
-                <a:tc vMerge="1">
-                  <a:txBody>
-                    <a:bodyPr/>
-                    <a:lstStyle/>
-                    <a:p>
-                      <a:pPr rtl="1"/>
-                      <a:endParaRPr lang="he-IL" dirty="0"/>
-                    </a:p>
-                  </a:txBody>
-                  <a:tcPr/>
+              <a:tr h="516065">
+                <a:tc>
+                  <a:txBody>
+                    <a:bodyPr/>
+                    <a:lstStyle/>
+                    <a:p>
+                      <a:pPr algn="ctr" rtl="1"/>
+                      <a:endParaRPr lang="he-IL" dirty="0"/>
+                    </a:p>
+                  </a:txBody>
+                  <a:tcPr anchor="ctr"/>
                 </a:tc>
                 <a:tc>
                   <a:txBody>
@@ -5082,27 +5328,12 @@
                   </a:txBody>
                   <a:tcPr anchor="ctr"/>
                 </a:tc>
-                <a:tc vMerge="1">
-                  <a:txBody>
-                    <a:bodyPr/>
-                    <a:lstStyle/>
-                    <a:p>
-                      <a:pPr rtl="1"/>
-                      <a:endParaRPr lang="he-IL" dirty="0"/>
-                    </a:p>
-                  </a:txBody>
-                  <a:tcPr/>
-                </a:tc>
-                <a:tc>
-                  <a:txBody>
-                    <a:bodyPr/>
-                    <a:lstStyle/>
-                    <a:p>
-                      <a:pPr algn="ctr" rtl="1"/>
-                      <a:r>
-                        <a:rPr lang="en-US" dirty="0"/>
-                        <a:t>3</a:t>
-                      </a:r>
+                <a:tc>
+                  <a:txBody>
+                    <a:bodyPr/>
+                    <a:lstStyle/>
+                    <a:p>
+                      <a:pPr algn="ctr" rtl="1"/>
                       <a:endParaRPr lang="he-IL" dirty="0"/>
                     </a:p>
                   </a:txBody>
@@ -5114,17 +5345,17 @@
                   </a:ext>
                 </a:extLst>
               </a:tr>
-              <a:tr h="370840">
-                <a:tc vMerge="1">
-                  <a:txBody>
-                    <a:bodyPr/>
-                    <a:lstStyle/>
-                    <a:p>
-                      <a:pPr rtl="1"/>
-                      <a:endParaRPr lang="he-IL" dirty="0"/>
-                    </a:p>
-                  </a:txBody>
-                  <a:tcPr/>
+              <a:tr h="516065">
+                <a:tc>
+                  <a:txBody>
+                    <a:bodyPr/>
+                    <a:lstStyle/>
+                    <a:p>
+                      <a:pPr algn="ctr" rtl="1"/>
+                      <a:endParaRPr lang="he-IL" dirty="0"/>
+                    </a:p>
+                  </a:txBody>
+                  <a:tcPr anchor="ctr"/>
                 </a:tc>
                 <a:tc>
                   <a:txBody>
@@ -5152,27 +5383,12 @@
                   </a:txBody>
                   <a:tcPr anchor="ctr"/>
                 </a:tc>
-                <a:tc vMerge="1">
-                  <a:txBody>
-                    <a:bodyPr/>
-                    <a:lstStyle/>
-                    <a:p>
-                      <a:pPr rtl="1"/>
-                      <a:endParaRPr lang="he-IL" dirty="0"/>
-                    </a:p>
-                  </a:txBody>
-                  <a:tcPr/>
-                </a:tc>
-                <a:tc>
-                  <a:txBody>
-                    <a:bodyPr/>
-                    <a:lstStyle/>
-                    <a:p>
-                      <a:pPr algn="ctr" rtl="1"/>
-                      <a:r>
-                        <a:rPr lang="en-US" dirty="0"/>
-                        <a:t>4</a:t>
-                      </a:r>
+                <a:tc>
+                  <a:txBody>
+                    <a:bodyPr/>
+                    <a:lstStyle/>
+                    <a:p>
+                      <a:pPr algn="ctr" rtl="1"/>
                       <a:endParaRPr lang="he-IL" dirty="0"/>
                     </a:p>
                   </a:txBody>
@@ -5184,17 +5400,17 @@
                   </a:ext>
                 </a:extLst>
               </a:tr>
-              <a:tr h="370840">
-                <a:tc vMerge="1">
-                  <a:txBody>
-                    <a:bodyPr/>
-                    <a:lstStyle/>
-                    <a:p>
-                      <a:pPr rtl="1"/>
-                      <a:endParaRPr lang="he-IL" dirty="0"/>
-                    </a:p>
-                  </a:txBody>
-                  <a:tcPr/>
+              <a:tr h="516065">
+                <a:tc>
+                  <a:txBody>
+                    <a:bodyPr/>
+                    <a:lstStyle/>
+                    <a:p>
+                      <a:pPr algn="ctr" rtl="1"/>
+                      <a:endParaRPr lang="he-IL" dirty="0"/>
+                    </a:p>
+                  </a:txBody>
+                  <a:tcPr anchor="ctr"/>
                 </a:tc>
                 <a:tc>
                   <a:txBody>
@@ -5222,27 +5438,12 @@
                   </a:txBody>
                   <a:tcPr anchor="ctr"/>
                 </a:tc>
-                <a:tc vMerge="1">
-                  <a:txBody>
-                    <a:bodyPr/>
-                    <a:lstStyle/>
-                    <a:p>
-                      <a:pPr rtl="1"/>
-                      <a:endParaRPr lang="he-IL" dirty="0"/>
-                    </a:p>
-                  </a:txBody>
-                  <a:tcPr/>
-                </a:tc>
-                <a:tc>
-                  <a:txBody>
-                    <a:bodyPr/>
-                    <a:lstStyle/>
-                    <a:p>
-                      <a:pPr algn="ctr" rtl="1"/>
-                      <a:r>
-                        <a:rPr lang="en-US" dirty="0"/>
-                        <a:t>5</a:t>
-                      </a:r>
+                <a:tc>
+                  <a:txBody>
+                    <a:bodyPr/>
+                    <a:lstStyle/>
+                    <a:p>
+                      <a:pPr algn="ctr" rtl="1"/>
                       <a:endParaRPr lang="he-IL" dirty="0"/>
                     </a:p>
                   </a:txBody>
@@ -5254,17 +5455,17 @@
                   </a:ext>
                 </a:extLst>
               </a:tr>
-              <a:tr h="370840">
-                <a:tc vMerge="1">
-                  <a:txBody>
-                    <a:bodyPr/>
-                    <a:lstStyle/>
-                    <a:p>
-                      <a:pPr rtl="1"/>
-                      <a:endParaRPr lang="he-IL" dirty="0"/>
-                    </a:p>
-                  </a:txBody>
-                  <a:tcPr/>
+              <a:tr h="516065">
+                <a:tc>
+                  <a:txBody>
+                    <a:bodyPr/>
+                    <a:lstStyle/>
+                    <a:p>
+                      <a:pPr algn="ctr" rtl="1"/>
+                      <a:endParaRPr lang="he-IL" dirty="0"/>
+                    </a:p>
+                  </a:txBody>
+                  <a:tcPr anchor="ctr"/>
                 </a:tc>
                 <a:tc gridSpan="2">
                   <a:txBody>
@@ -5292,27 +5493,12 @@
                   </a:txBody>
                   <a:tcPr anchor="ctr"/>
                 </a:tc>
-                <a:tc vMerge="1">
-                  <a:txBody>
-                    <a:bodyPr/>
-                    <a:lstStyle/>
-                    <a:p>
-                      <a:pPr rtl="1"/>
-                      <a:endParaRPr lang="he-IL" dirty="0"/>
-                    </a:p>
-                  </a:txBody>
-                  <a:tcPr/>
-                </a:tc>
-                <a:tc>
-                  <a:txBody>
-                    <a:bodyPr/>
-                    <a:lstStyle/>
-                    <a:p>
-                      <a:pPr algn="ctr" rtl="1"/>
-                      <a:r>
-                        <a:rPr lang="en-US" dirty="0"/>
-                        <a:t>6</a:t>
-                      </a:r>
+                <a:tc>
+                  <a:txBody>
+                    <a:bodyPr/>
+                    <a:lstStyle/>
+                    <a:p>
+                      <a:pPr algn="ctr" rtl="1"/>
                       <a:endParaRPr lang="he-IL" dirty="0"/>
                     </a:p>
                   </a:txBody>
@@ -5324,17 +5510,17 @@
                   </a:ext>
                 </a:extLst>
               </a:tr>
-              <a:tr h="370840">
-                <a:tc vMerge="1">
-                  <a:txBody>
-                    <a:bodyPr/>
-                    <a:lstStyle/>
-                    <a:p>
-                      <a:pPr rtl="1"/>
-                      <a:endParaRPr lang="he-IL" dirty="0"/>
-                    </a:p>
-                  </a:txBody>
-                  <a:tcPr/>
+              <a:tr h="516065">
+                <a:tc>
+                  <a:txBody>
+                    <a:bodyPr/>
+                    <a:lstStyle/>
+                    <a:p>
+                      <a:pPr algn="ctr" rtl="1"/>
+                      <a:endParaRPr lang="he-IL" dirty="0"/>
+                    </a:p>
+                  </a:txBody>
+                  <a:tcPr anchor="ctr"/>
                 </a:tc>
                 <a:tc gridSpan="2">
                   <a:txBody>
@@ -5362,27 +5548,12 @@
                   </a:txBody>
                   <a:tcPr anchor="ctr"/>
                 </a:tc>
-                <a:tc vMerge="1">
-                  <a:txBody>
-                    <a:bodyPr/>
-                    <a:lstStyle/>
-                    <a:p>
-                      <a:pPr rtl="1"/>
-                      <a:endParaRPr lang="he-IL" dirty="0"/>
-                    </a:p>
-                  </a:txBody>
-                  <a:tcPr/>
-                </a:tc>
-                <a:tc>
-                  <a:txBody>
-                    <a:bodyPr/>
-                    <a:lstStyle/>
-                    <a:p>
-                      <a:pPr algn="ctr" rtl="1"/>
-                      <a:r>
-                        <a:rPr lang="en-US" dirty="0"/>
-                        <a:t>7</a:t>
-                      </a:r>
+                <a:tc>
+                  <a:txBody>
+                    <a:bodyPr/>
+                    <a:lstStyle/>
+                    <a:p>
+                      <a:pPr algn="ctr" rtl="1"/>
                       <a:endParaRPr lang="he-IL" dirty="0"/>
                     </a:p>
                   </a:txBody>
@@ -5394,61 +5565,46 @@
                   </a:ext>
                 </a:extLst>
               </a:tr>
-              <a:tr h="370840">
-                <a:tc gridSpan="4">
-                  <a:txBody>
-                    <a:bodyPr/>
-                    <a:lstStyle/>
-                    <a:p>
-                      <a:pPr algn="ctr" rtl="1"/>
-                      <a:endParaRPr lang="he-IL" dirty="0"/>
-                    </a:p>
-                  </a:txBody>
-                  <a:tcPr anchor="ctr"/>
-                </a:tc>
-                <a:tc hMerge="1">
-                  <a:txBody>
-                    <a:bodyPr/>
-                    <a:lstStyle/>
-                    <a:p>
-                      <a:pPr rtl="1"/>
-                      <a:endParaRPr lang="he-IL"/>
-                    </a:p>
-                  </a:txBody>
-                  <a:tcPr/>
-                </a:tc>
-                <a:tc hMerge="1">
-                  <a:txBody>
-                    <a:bodyPr/>
-                    <a:lstStyle/>
-                    <a:p>
-                      <a:pPr rtl="1"/>
-                      <a:endParaRPr lang="he-IL"/>
-                    </a:p>
-                  </a:txBody>
-                  <a:tcPr/>
-                </a:tc>
-                <a:tc hMerge="1">
-                  <a:txBody>
-                    <a:bodyPr/>
-                    <a:lstStyle/>
-                    <a:p>
-                      <a:pPr rtl="1"/>
-                      <a:endParaRPr lang="he-IL" dirty="0"/>
-                    </a:p>
-                  </a:txBody>
-                  <a:tcPr/>
-                </a:tc>
-                <a:tc>
-                  <a:txBody>
-                    <a:bodyPr/>
-                    <a:lstStyle/>
-                    <a:p>
-                      <a:pPr algn="ctr" rtl="1"/>
-                      <a:r>
-                        <a:rPr lang="en-US" dirty="0"/>
-                        <a:t>8</a:t>
-                      </a:r>
+              <a:tr h="516065">
+                <a:tc>
+                  <a:txBody>
+                    <a:bodyPr/>
+                    <a:lstStyle/>
+                    <a:p>
+                      <a:pPr algn="ctr" rtl="1"/>
+                      <a:endParaRPr lang="he-IL" dirty="0"/>
+                    </a:p>
+                  </a:txBody>
+                  <a:tcPr anchor="ctr"/>
+                </a:tc>
+                <a:tc>
+                  <a:txBody>
+                    <a:bodyPr/>
+                    <a:lstStyle/>
+                    <a:p>
+                      <a:pPr algn="ctr" rtl="1"/>
+                      <a:endParaRPr lang="he-IL" dirty="0"/>
+                    </a:p>
+                  </a:txBody>
+                  <a:tcPr anchor="ctr"/>
+                </a:tc>
+                <a:tc>
+                  <a:txBody>
+                    <a:bodyPr/>
+                    <a:lstStyle/>
+                    <a:p>
+                      <a:pPr algn="ctr" rtl="1"/>
+                      <a:endParaRPr lang="he-IL" dirty="0"/>
+                    </a:p>
+                  </a:txBody>
+                  <a:tcPr anchor="ctr"/>
+                </a:tc>
+                <a:tc>
+                  <a:txBody>
+                    <a:bodyPr/>
+                    <a:lstStyle/>
+                    <a:p>
+                      <a:pPr algn="ctr" rtl="1"/>
                       <a:endParaRPr lang="he-IL" dirty="0"/>
                     </a:p>
                   </a:txBody>
@@ -5464,6 +5620,656 @@
           </a:graphicData>
         </a:graphic>
       </p:graphicFrame>
+      <p:sp>
+        <p:nvSpPr>
+          <p:cNvPr id="3" name="מלבן 2">
+            <a:extLst>
+              <a:ext uri="{FF2B5EF4-FFF2-40B4-BE49-F238E27FC236}">
+                <a16:creationId xmlns:a16="http://schemas.microsoft.com/office/drawing/2014/main" id="{A917A00A-7D6A-D83D-3F88-7E9027D12879}"/>
+              </a:ext>
+            </a:extLst>
+          </p:cNvPr>
+          <p:cNvSpPr/>
+          <p:nvPr/>
+        </p:nvSpPr>
+        <p:spPr>
+          <a:xfrm>
+            <a:off x="1595882" y="1881303"/>
+            <a:ext cx="228600" cy="301752"/>
+          </a:xfrm>
+          <a:prstGeom prst="rect">
+            <a:avLst/>
+          </a:prstGeom>
+        </p:spPr>
+        <p:style>
+          <a:lnRef idx="2">
+            <a:schemeClr val="accent1">
+              <a:shade val="15000"/>
+            </a:schemeClr>
+          </a:lnRef>
+          <a:fillRef idx="1">
+            <a:schemeClr val="accent1"/>
+          </a:fillRef>
+          <a:effectRef idx="0">
+            <a:schemeClr val="accent1"/>
+          </a:effectRef>
+          <a:fontRef idx="minor">
+            <a:schemeClr val="lt1"/>
+          </a:fontRef>
+        </p:style>
+        <p:txBody>
+          <a:bodyPr rtlCol="1" anchor="ctr"/>
+          <a:lstStyle/>
+          <a:p>
+            <a:pPr algn="ctr"/>
+            <a:r>
+              <a:rPr lang="en-US" dirty="0"/>
+              <a:t>1</a:t>
+            </a:r>
+            <a:endParaRPr lang="he-IL" dirty="0"/>
+          </a:p>
+        </p:txBody>
+      </p:sp>
+      <p:sp>
+        <p:nvSpPr>
+          <p:cNvPr id="4" name="מלבן 3">
+            <a:extLst>
+              <a:ext uri="{FF2B5EF4-FFF2-40B4-BE49-F238E27FC236}">
+                <a16:creationId xmlns:a16="http://schemas.microsoft.com/office/drawing/2014/main" id="{F3A7191B-1C58-11D9-9F12-AAEEF54B5191}"/>
+              </a:ext>
+            </a:extLst>
+          </p:cNvPr>
+          <p:cNvSpPr/>
+          <p:nvPr/>
+        </p:nvSpPr>
+        <p:spPr>
+          <a:xfrm>
+            <a:off x="3759200" y="1881303"/>
+            <a:ext cx="228600" cy="301752"/>
+          </a:xfrm>
+          <a:prstGeom prst="rect">
+            <a:avLst/>
+          </a:prstGeom>
+        </p:spPr>
+        <p:style>
+          <a:lnRef idx="2">
+            <a:schemeClr val="accent1">
+              <a:shade val="15000"/>
+            </a:schemeClr>
+          </a:lnRef>
+          <a:fillRef idx="1">
+            <a:schemeClr val="accent1"/>
+          </a:fillRef>
+          <a:effectRef idx="0">
+            <a:schemeClr val="accent1"/>
+          </a:effectRef>
+          <a:fontRef idx="minor">
+            <a:schemeClr val="lt1"/>
+          </a:fontRef>
+        </p:style>
+        <p:txBody>
+          <a:bodyPr rtlCol="1" anchor="ctr"/>
+          <a:lstStyle/>
+          <a:p>
+            <a:pPr algn="ctr"/>
+            <a:r>
+              <a:rPr lang="en-US" dirty="0"/>
+              <a:t>2</a:t>
+            </a:r>
+            <a:endParaRPr lang="he-IL" dirty="0"/>
+          </a:p>
+        </p:txBody>
+      </p:sp>
+      <p:sp>
+        <p:nvSpPr>
+          <p:cNvPr id="6" name="מלבן 5">
+            <a:extLst>
+              <a:ext uri="{FF2B5EF4-FFF2-40B4-BE49-F238E27FC236}">
+                <a16:creationId xmlns:a16="http://schemas.microsoft.com/office/drawing/2014/main" id="{61FB2FAE-5365-797F-EDAD-0602BC44906D}"/>
+              </a:ext>
+            </a:extLst>
+          </p:cNvPr>
+          <p:cNvSpPr/>
+          <p:nvPr/>
+        </p:nvSpPr>
+        <p:spPr>
+          <a:xfrm>
+            <a:off x="5729732" y="1881303"/>
+            <a:ext cx="228600" cy="301752"/>
+          </a:xfrm>
+          <a:prstGeom prst="rect">
+            <a:avLst/>
+          </a:prstGeom>
+        </p:spPr>
+        <p:style>
+          <a:lnRef idx="2">
+            <a:schemeClr val="accent1">
+              <a:shade val="15000"/>
+            </a:schemeClr>
+          </a:lnRef>
+          <a:fillRef idx="1">
+            <a:schemeClr val="accent1"/>
+          </a:fillRef>
+          <a:effectRef idx="0">
+            <a:schemeClr val="accent1"/>
+          </a:effectRef>
+          <a:fontRef idx="minor">
+            <a:schemeClr val="lt1"/>
+          </a:fontRef>
+        </p:style>
+        <p:txBody>
+          <a:bodyPr rtlCol="1" anchor="ctr"/>
+          <a:lstStyle/>
+          <a:p>
+            <a:pPr algn="ctr"/>
+            <a:r>
+              <a:rPr lang="en-US" dirty="0"/>
+              <a:t>3</a:t>
+            </a:r>
+            <a:endParaRPr lang="he-IL" dirty="0"/>
+          </a:p>
+        </p:txBody>
+      </p:sp>
+      <p:sp>
+        <p:nvSpPr>
+          <p:cNvPr id="8" name="מלבן 7">
+            <a:extLst>
+              <a:ext uri="{FF2B5EF4-FFF2-40B4-BE49-F238E27FC236}">
+                <a16:creationId xmlns:a16="http://schemas.microsoft.com/office/drawing/2014/main" id="{7B8F7198-F0C9-3015-2208-046529BE7AA7}"/>
+              </a:ext>
+            </a:extLst>
+          </p:cNvPr>
+          <p:cNvSpPr/>
+          <p:nvPr/>
+        </p:nvSpPr>
+        <p:spPr>
+          <a:xfrm>
+            <a:off x="7700264" y="1881303"/>
+            <a:ext cx="228600" cy="301752"/>
+          </a:xfrm>
+          <a:prstGeom prst="rect">
+            <a:avLst/>
+          </a:prstGeom>
+        </p:spPr>
+        <p:style>
+          <a:lnRef idx="2">
+            <a:schemeClr val="accent1">
+              <a:shade val="15000"/>
+            </a:schemeClr>
+          </a:lnRef>
+          <a:fillRef idx="1">
+            <a:schemeClr val="accent1"/>
+          </a:fillRef>
+          <a:effectRef idx="0">
+            <a:schemeClr val="accent1"/>
+          </a:effectRef>
+          <a:fontRef idx="minor">
+            <a:schemeClr val="lt1"/>
+          </a:fontRef>
+        </p:style>
+        <p:txBody>
+          <a:bodyPr rtlCol="1" anchor="ctr"/>
+          <a:lstStyle/>
+          <a:p>
+            <a:pPr algn="ctr"/>
+            <a:r>
+              <a:rPr lang="en-US" dirty="0"/>
+              <a:t>4</a:t>
+            </a:r>
+            <a:endParaRPr lang="he-IL" dirty="0"/>
+          </a:p>
+        </p:txBody>
+      </p:sp>
+      <p:sp>
+        <p:nvSpPr>
+          <p:cNvPr id="9" name="מלבן 8">
+            <a:extLst>
+              <a:ext uri="{FF2B5EF4-FFF2-40B4-BE49-F238E27FC236}">
+                <a16:creationId xmlns:a16="http://schemas.microsoft.com/office/drawing/2014/main" id="{4EFC3811-94F6-F224-C4AC-1768FC9851CB}"/>
+              </a:ext>
+            </a:extLst>
+          </p:cNvPr>
+          <p:cNvSpPr/>
+          <p:nvPr/>
+        </p:nvSpPr>
+        <p:spPr>
+          <a:xfrm>
+            <a:off x="9597644" y="1881303"/>
+            <a:ext cx="228600" cy="301752"/>
+          </a:xfrm>
+          <a:prstGeom prst="rect">
+            <a:avLst/>
+          </a:prstGeom>
+        </p:spPr>
+        <p:style>
+          <a:lnRef idx="2">
+            <a:schemeClr val="accent1">
+              <a:shade val="15000"/>
+            </a:schemeClr>
+          </a:lnRef>
+          <a:fillRef idx="1">
+            <a:schemeClr val="accent1"/>
+          </a:fillRef>
+          <a:effectRef idx="0">
+            <a:schemeClr val="accent1"/>
+          </a:effectRef>
+          <a:fontRef idx="minor">
+            <a:schemeClr val="lt1"/>
+          </a:fontRef>
+        </p:style>
+        <p:txBody>
+          <a:bodyPr rtlCol="1" anchor="ctr"/>
+          <a:lstStyle/>
+          <a:p>
+            <a:pPr algn="ctr"/>
+            <a:r>
+              <a:rPr lang="en-US" dirty="0"/>
+              <a:t>5</a:t>
+            </a:r>
+            <a:endParaRPr lang="he-IL" dirty="0"/>
+          </a:p>
+        </p:txBody>
+      </p:sp>
+      <p:sp>
+        <p:nvSpPr>
+          <p:cNvPr id="11" name="מלבן 10">
+            <a:extLst>
+              <a:ext uri="{FF2B5EF4-FFF2-40B4-BE49-F238E27FC236}">
+                <a16:creationId xmlns:a16="http://schemas.microsoft.com/office/drawing/2014/main" id="{A8247168-2CAE-92ED-83B2-EA2D91A3DB4D}"/>
+              </a:ext>
+            </a:extLst>
+          </p:cNvPr>
+          <p:cNvSpPr/>
+          <p:nvPr/>
+        </p:nvSpPr>
+        <p:spPr>
+          <a:xfrm>
+            <a:off x="1595882" y="2646890"/>
+            <a:ext cx="228600" cy="301752"/>
+          </a:xfrm>
+          <a:prstGeom prst="rect">
+            <a:avLst/>
+          </a:prstGeom>
+        </p:spPr>
+        <p:style>
+          <a:lnRef idx="2">
+            <a:schemeClr val="accent1">
+              <a:shade val="15000"/>
+            </a:schemeClr>
+          </a:lnRef>
+          <a:fillRef idx="1">
+            <a:schemeClr val="accent1"/>
+          </a:fillRef>
+          <a:effectRef idx="0">
+            <a:schemeClr val="accent1"/>
+          </a:effectRef>
+          <a:fontRef idx="minor">
+            <a:schemeClr val="lt1"/>
+          </a:fontRef>
+        </p:style>
+        <p:txBody>
+          <a:bodyPr rtlCol="1" anchor="ctr"/>
+          <a:lstStyle/>
+          <a:p>
+            <a:pPr algn="ctr"/>
+            <a:r>
+              <a:rPr lang="en-US" dirty="0"/>
+              <a:t>2</a:t>
+            </a:r>
+            <a:endParaRPr lang="he-IL" dirty="0"/>
+          </a:p>
+        </p:txBody>
+      </p:sp>
+      <p:sp>
+        <p:nvSpPr>
+          <p:cNvPr id="12" name="מלבן 11">
+            <a:extLst>
+              <a:ext uri="{FF2B5EF4-FFF2-40B4-BE49-F238E27FC236}">
+                <a16:creationId xmlns:a16="http://schemas.microsoft.com/office/drawing/2014/main" id="{7D770029-2394-67A1-8175-64B7BFB6EA02}"/>
+              </a:ext>
+            </a:extLst>
+          </p:cNvPr>
+          <p:cNvSpPr/>
+          <p:nvPr/>
+        </p:nvSpPr>
+        <p:spPr>
+          <a:xfrm>
+            <a:off x="1595882" y="3127248"/>
+            <a:ext cx="228600" cy="301752"/>
+          </a:xfrm>
+          <a:prstGeom prst="rect">
+            <a:avLst/>
+          </a:prstGeom>
+        </p:spPr>
+        <p:style>
+          <a:lnRef idx="2">
+            <a:schemeClr val="accent1">
+              <a:shade val="15000"/>
+            </a:schemeClr>
+          </a:lnRef>
+          <a:fillRef idx="1">
+            <a:schemeClr val="accent1"/>
+          </a:fillRef>
+          <a:effectRef idx="0">
+            <a:schemeClr val="accent1"/>
+          </a:effectRef>
+          <a:fontRef idx="minor">
+            <a:schemeClr val="lt1"/>
+          </a:fontRef>
+        </p:style>
+        <p:txBody>
+          <a:bodyPr rtlCol="1" anchor="ctr"/>
+          <a:lstStyle/>
+          <a:p>
+            <a:pPr algn="ctr"/>
+            <a:r>
+              <a:rPr lang="en-US" dirty="0"/>
+              <a:t>3</a:t>
+            </a:r>
+            <a:endParaRPr lang="he-IL" dirty="0"/>
+          </a:p>
+        </p:txBody>
+      </p:sp>
+      <p:sp>
+        <p:nvSpPr>
+          <p:cNvPr id="13" name="מלבן 12">
+            <a:extLst>
+              <a:ext uri="{FF2B5EF4-FFF2-40B4-BE49-F238E27FC236}">
+                <a16:creationId xmlns:a16="http://schemas.microsoft.com/office/drawing/2014/main" id="{7BE7B8C1-1950-1354-B8BE-274B5D002DFB}"/>
+              </a:ext>
+            </a:extLst>
+          </p:cNvPr>
+          <p:cNvSpPr/>
+          <p:nvPr/>
+        </p:nvSpPr>
+        <p:spPr>
+          <a:xfrm>
+            <a:off x="1595882" y="3638418"/>
+            <a:ext cx="228600" cy="301752"/>
+          </a:xfrm>
+          <a:prstGeom prst="rect">
+            <a:avLst/>
+          </a:prstGeom>
+        </p:spPr>
+        <p:style>
+          <a:lnRef idx="2">
+            <a:schemeClr val="accent1">
+              <a:shade val="15000"/>
+            </a:schemeClr>
+          </a:lnRef>
+          <a:fillRef idx="1">
+            <a:schemeClr val="accent1"/>
+          </a:fillRef>
+          <a:effectRef idx="0">
+            <a:schemeClr val="accent1"/>
+          </a:effectRef>
+          <a:fontRef idx="minor">
+            <a:schemeClr val="lt1"/>
+          </a:fontRef>
+        </p:style>
+        <p:txBody>
+          <a:bodyPr rtlCol="1" anchor="ctr"/>
+          <a:lstStyle/>
+          <a:p>
+            <a:pPr algn="ctr"/>
+            <a:r>
+              <a:rPr lang="en-US" dirty="0"/>
+              <a:t>4</a:t>
+            </a:r>
+            <a:endParaRPr lang="he-IL" dirty="0"/>
+          </a:p>
+        </p:txBody>
+      </p:sp>
+      <p:sp>
+        <p:nvSpPr>
+          <p:cNvPr id="14" name="מלבן 13">
+            <a:extLst>
+              <a:ext uri="{FF2B5EF4-FFF2-40B4-BE49-F238E27FC236}">
+                <a16:creationId xmlns:a16="http://schemas.microsoft.com/office/drawing/2014/main" id="{171D74F7-DAD5-26D5-2121-B74224BEB256}"/>
+              </a:ext>
+            </a:extLst>
+          </p:cNvPr>
+          <p:cNvSpPr/>
+          <p:nvPr/>
+        </p:nvSpPr>
+        <p:spPr>
+          <a:xfrm>
+            <a:off x="1595882" y="4169847"/>
+            <a:ext cx="228600" cy="301752"/>
+          </a:xfrm>
+          <a:prstGeom prst="rect">
+            <a:avLst/>
+          </a:prstGeom>
+        </p:spPr>
+        <p:style>
+          <a:lnRef idx="2">
+            <a:schemeClr val="accent1">
+              <a:shade val="15000"/>
+            </a:schemeClr>
+          </a:lnRef>
+          <a:fillRef idx="1">
+            <a:schemeClr val="accent1"/>
+          </a:fillRef>
+          <a:effectRef idx="0">
+            <a:schemeClr val="accent1"/>
+          </a:effectRef>
+          <a:fontRef idx="minor">
+            <a:schemeClr val="lt1"/>
+          </a:fontRef>
+        </p:style>
+        <p:txBody>
+          <a:bodyPr rtlCol="1" anchor="ctr"/>
+          <a:lstStyle/>
+          <a:p>
+            <a:pPr algn="ctr"/>
+            <a:r>
+              <a:rPr lang="en-US" dirty="0"/>
+              <a:t>5</a:t>
+            </a:r>
+            <a:endParaRPr lang="he-IL" dirty="0"/>
+          </a:p>
+        </p:txBody>
+      </p:sp>
+      <p:sp>
+        <p:nvSpPr>
+          <p:cNvPr id="15" name="מלבן 14">
+            <a:extLst>
+              <a:ext uri="{FF2B5EF4-FFF2-40B4-BE49-F238E27FC236}">
+                <a16:creationId xmlns:a16="http://schemas.microsoft.com/office/drawing/2014/main" id="{5431027D-454F-36D3-9DA4-98DBDF795690}"/>
+              </a:ext>
+            </a:extLst>
+          </p:cNvPr>
+          <p:cNvSpPr/>
+          <p:nvPr/>
+        </p:nvSpPr>
+        <p:spPr>
+          <a:xfrm>
+            <a:off x="1595882" y="4709858"/>
+            <a:ext cx="228600" cy="301752"/>
+          </a:xfrm>
+          <a:prstGeom prst="rect">
+            <a:avLst/>
+          </a:prstGeom>
+        </p:spPr>
+        <p:style>
+          <a:lnRef idx="2">
+            <a:schemeClr val="accent1">
+              <a:shade val="15000"/>
+            </a:schemeClr>
+          </a:lnRef>
+          <a:fillRef idx="1">
+            <a:schemeClr val="accent1"/>
+          </a:fillRef>
+          <a:effectRef idx="0">
+            <a:schemeClr val="accent1"/>
+          </a:effectRef>
+          <a:fontRef idx="minor">
+            <a:schemeClr val="lt1"/>
+          </a:fontRef>
+        </p:style>
+        <p:txBody>
+          <a:bodyPr rtlCol="1" anchor="ctr"/>
+          <a:lstStyle/>
+          <a:p>
+            <a:pPr algn="ctr"/>
+            <a:r>
+              <a:rPr lang="en-US" dirty="0"/>
+              <a:t>6</a:t>
+            </a:r>
+            <a:endParaRPr lang="he-IL" dirty="0"/>
+          </a:p>
+        </p:txBody>
+      </p:sp>
+      <p:sp>
+        <p:nvSpPr>
+          <p:cNvPr id="16" name="מלבן 15">
+            <a:extLst>
+              <a:ext uri="{FF2B5EF4-FFF2-40B4-BE49-F238E27FC236}">
+                <a16:creationId xmlns:a16="http://schemas.microsoft.com/office/drawing/2014/main" id="{3CA67437-9A3C-EA80-DEA7-73666F8F7768}"/>
+              </a:ext>
+            </a:extLst>
+          </p:cNvPr>
+          <p:cNvSpPr/>
+          <p:nvPr/>
+        </p:nvSpPr>
+        <p:spPr>
+          <a:xfrm>
+            <a:off x="1595882" y="5221028"/>
+            <a:ext cx="228600" cy="301752"/>
+          </a:xfrm>
+          <a:prstGeom prst="rect">
+            <a:avLst/>
+          </a:prstGeom>
+        </p:spPr>
+        <p:style>
+          <a:lnRef idx="2">
+            <a:schemeClr val="accent1">
+              <a:shade val="15000"/>
+            </a:schemeClr>
+          </a:lnRef>
+          <a:fillRef idx="1">
+            <a:schemeClr val="accent1"/>
+          </a:fillRef>
+          <a:effectRef idx="0">
+            <a:schemeClr val="accent1"/>
+          </a:effectRef>
+          <a:fontRef idx="minor">
+            <a:schemeClr val="lt1"/>
+          </a:fontRef>
+        </p:style>
+        <p:txBody>
+          <a:bodyPr rtlCol="1" anchor="ctr"/>
+          <a:lstStyle/>
+          <a:p>
+            <a:pPr algn="ctr"/>
+            <a:r>
+              <a:rPr lang="en-US" dirty="0"/>
+              <a:t>7</a:t>
+            </a:r>
+            <a:endParaRPr lang="he-IL" dirty="0"/>
+          </a:p>
+        </p:txBody>
+      </p:sp>
+      <p:sp>
+        <p:nvSpPr>
+          <p:cNvPr id="17" name="מלבן 16">
+            <a:extLst>
+              <a:ext uri="{FF2B5EF4-FFF2-40B4-BE49-F238E27FC236}">
+                <a16:creationId xmlns:a16="http://schemas.microsoft.com/office/drawing/2014/main" id="{DC4DFE18-1624-F0A6-4C6B-8FD792FBDCEA}"/>
+              </a:ext>
+            </a:extLst>
+          </p:cNvPr>
+          <p:cNvSpPr/>
+          <p:nvPr/>
+        </p:nvSpPr>
+        <p:spPr>
+          <a:xfrm>
+            <a:off x="1595882" y="5701386"/>
+            <a:ext cx="228600" cy="301752"/>
+          </a:xfrm>
+          <a:prstGeom prst="rect">
+            <a:avLst/>
+          </a:prstGeom>
+        </p:spPr>
+        <p:style>
+          <a:lnRef idx="2">
+            <a:schemeClr val="accent1">
+              <a:shade val="15000"/>
+            </a:schemeClr>
+          </a:lnRef>
+          <a:fillRef idx="1">
+            <a:schemeClr val="accent1"/>
+          </a:fillRef>
+          <a:effectRef idx="0">
+            <a:schemeClr val="accent1"/>
+          </a:effectRef>
+          <a:fontRef idx="minor">
+            <a:schemeClr val="lt1"/>
+          </a:fontRef>
+        </p:style>
+        <p:txBody>
+          <a:bodyPr rtlCol="1" anchor="ctr"/>
+          <a:lstStyle/>
+          <a:p>
+            <a:pPr algn="ctr"/>
+            <a:r>
+              <a:rPr lang="en-US" dirty="0"/>
+              <a:t>8</a:t>
+            </a:r>
+            <a:endParaRPr lang="he-IL" dirty="0"/>
+          </a:p>
+        </p:txBody>
+      </p:sp>
+      <p:sp>
+        <p:nvSpPr>
+          <p:cNvPr id="18" name="מלבן 17">
+            <a:extLst>
+              <a:ext uri="{FF2B5EF4-FFF2-40B4-BE49-F238E27FC236}">
+                <a16:creationId xmlns:a16="http://schemas.microsoft.com/office/drawing/2014/main" id="{E4F56B53-8A95-E32D-0E69-250D5B6C8150}"/>
+              </a:ext>
+            </a:extLst>
+          </p:cNvPr>
+          <p:cNvSpPr/>
+          <p:nvPr/>
+        </p:nvSpPr>
+        <p:spPr>
+          <a:xfrm>
+            <a:off x="1595882" y="6200534"/>
+            <a:ext cx="228600" cy="301752"/>
+          </a:xfrm>
+          <a:prstGeom prst="rect">
+            <a:avLst/>
+          </a:prstGeom>
+        </p:spPr>
+        <p:style>
+          <a:lnRef idx="2">
+            <a:schemeClr val="accent1">
+              <a:shade val="15000"/>
+            </a:schemeClr>
+          </a:lnRef>
+          <a:fillRef idx="1">
+            <a:schemeClr val="accent1"/>
+          </a:fillRef>
+          <a:effectRef idx="0">
+            <a:schemeClr val="accent1"/>
+          </a:effectRef>
+          <a:fontRef idx="minor">
+            <a:schemeClr val="lt1"/>
+          </a:fontRef>
+        </p:style>
+        <p:txBody>
+          <a:bodyPr rtlCol="1" anchor="ctr"/>
+          <a:lstStyle/>
+          <a:p>
+            <a:pPr algn="ctr"/>
+            <a:r>
+              <a:rPr lang="en-US" dirty="0"/>
+              <a:t>9</a:t>
+            </a:r>
+            <a:endParaRPr lang="he-IL" dirty="0"/>
+          </a:p>
+        </p:txBody>
+      </p:sp>
     </p:spTree>
     <p:extLst>
       <p:ext uri="{BB962C8B-B14F-4D97-AF65-F5344CB8AC3E}">

</xml_diff>

<commit_message>
English Language Support including mobile is now completed in test!
</commit_message>
<xml_diff>
--- a/images/advance_css_area_help_source/programming-lang-info layout plan.pptx
+++ b/images/advance_css_area_help_source/programming-lang-info layout plan.pptx
@@ -4366,14 +4366,14 @@
           <p:nvPr>
             <p:extLst>
               <p:ext uri="{D42A27DB-BD31-4B8C-83A1-F6EECF244321}">
-                <p14:modId xmlns:p14="http://schemas.microsoft.com/office/powerpoint/2010/main" val="3704292123"/>
+                <p14:modId xmlns:p14="http://schemas.microsoft.com/office/powerpoint/2010/main" val="1243123021"/>
               </p:ext>
             </p:extLst>
           </p:nvPr>
         </p:nvGraphicFramePr>
         <p:xfrm>
-          <a:off x="725488" y="2105659"/>
-          <a:ext cx="10741024" cy="2646681"/>
+          <a:off x="1492671" y="1941066"/>
+          <a:ext cx="9206658" cy="3426462"/>
         </p:xfrm>
         <a:graphic>
           <a:graphicData uri="http://schemas.openxmlformats.org/drawingml/2006/table">
@@ -4382,244 +4382,111 @@
                 <a:tableStyleId>{BC89EF96-8CEA-46FF-86C4-4CE0E7609802}</a:tableStyleId>
               </a:tblPr>
               <a:tblGrid>
-                <a:gridCol w="1534432">
+                <a:gridCol w="1534443">
                   <a:extLst>
                     <a:ext uri="{9D8B030D-6E8A-4147-A177-3AD203B41FA5}">
                       <a16:colId xmlns:a16="http://schemas.microsoft.com/office/drawing/2014/main" val="4084826677"/>
                     </a:ext>
                   </a:extLst>
                 </a:gridCol>
-                <a:gridCol w="1534432">
+                <a:gridCol w="1534443">
                   <a:extLst>
                     <a:ext uri="{9D8B030D-6E8A-4147-A177-3AD203B41FA5}">
                       <a16:colId xmlns:a16="http://schemas.microsoft.com/office/drawing/2014/main" val="2386447839"/>
                     </a:ext>
                   </a:extLst>
                 </a:gridCol>
-                <a:gridCol w="1534432">
+                <a:gridCol w="1534443">
                   <a:extLst>
                     <a:ext uri="{9D8B030D-6E8A-4147-A177-3AD203B41FA5}">
                       <a16:colId xmlns:a16="http://schemas.microsoft.com/office/drawing/2014/main" val="518523327"/>
                     </a:ext>
                   </a:extLst>
                 </a:gridCol>
-                <a:gridCol w="1534432">
+                <a:gridCol w="1534443">
                   <a:extLst>
                     <a:ext uri="{9D8B030D-6E8A-4147-A177-3AD203B41FA5}">
                       <a16:colId xmlns:a16="http://schemas.microsoft.com/office/drawing/2014/main" val="2712887710"/>
                     </a:ext>
                   </a:extLst>
                 </a:gridCol>
-                <a:gridCol w="1534432">
+                <a:gridCol w="1534443">
                   <a:extLst>
                     <a:ext uri="{9D8B030D-6E8A-4147-A177-3AD203B41FA5}">
                       <a16:colId xmlns:a16="http://schemas.microsoft.com/office/drawing/2014/main" val="3623793213"/>
                     </a:ext>
                   </a:extLst>
                 </a:gridCol>
-                <a:gridCol w="1534432">
+                <a:gridCol w="1534443">
                   <a:extLst>
                     <a:ext uri="{9D8B030D-6E8A-4147-A177-3AD203B41FA5}">
                       <a16:colId xmlns:a16="http://schemas.microsoft.com/office/drawing/2014/main" val="2326964834"/>
                     </a:ext>
                   </a:extLst>
                 </a:gridCol>
-                <a:gridCol w="1534432">
-                  <a:extLst>
-                    <a:ext uri="{9D8B030D-6E8A-4147-A177-3AD203B41FA5}">
-                      <a16:colId xmlns:a16="http://schemas.microsoft.com/office/drawing/2014/main" val="2543996263"/>
-                    </a:ext>
-                  </a:extLst>
-                </a:gridCol>
               </a:tblGrid>
-              <a:tr h="701277">
-                <a:tc>
-                  <a:txBody>
-                    <a:bodyPr/>
-                    <a:lstStyle/>
-                    <a:p>
-                      <a:pPr algn="ctr" rtl="1"/>
-                      <a:r>
-                        <a:rPr lang="en-US" dirty="0"/>
-                        <a:t>6</a:t>
-                      </a:r>
-                      <a:endParaRPr lang="he-IL" dirty="0"/>
-                    </a:p>
-                  </a:txBody>
-                  <a:tcPr anchor="ctr"/>
-                </a:tc>
-                <a:tc>
-                  <a:txBody>
-                    <a:bodyPr/>
-                    <a:lstStyle/>
-                    <a:p>
-                      <a:pPr algn="ctr" rtl="1"/>
-                      <a:r>
-                        <a:rPr lang="en-US" dirty="0"/>
-                        <a:t>5</a:t>
-                      </a:r>
-                      <a:endParaRPr lang="he-IL" dirty="0"/>
-                    </a:p>
-                  </a:txBody>
-                  <a:tcPr anchor="ctr"/>
-                </a:tc>
-                <a:tc>
-                  <a:txBody>
-                    <a:bodyPr/>
-                    <a:lstStyle/>
-                    <a:p>
-                      <a:pPr algn="ctr" rtl="1"/>
-                      <a:r>
-                        <a:rPr lang="en-US" dirty="0"/>
-                        <a:t>4</a:t>
-                      </a:r>
-                      <a:endParaRPr lang="he-IL" dirty="0"/>
-                    </a:p>
-                  </a:txBody>
-                  <a:tcPr anchor="ctr"/>
-                </a:tc>
-                <a:tc>
-                  <a:txBody>
-                    <a:bodyPr/>
-                    <a:lstStyle/>
-                    <a:p>
-                      <a:pPr algn="ctr" rtl="1"/>
-                      <a:r>
-                        <a:rPr lang="en-US" dirty="0"/>
-                        <a:t>3</a:t>
-                      </a:r>
-                      <a:endParaRPr lang="he-IL" dirty="0"/>
-                    </a:p>
-                  </a:txBody>
-                  <a:tcPr anchor="ctr"/>
-                </a:tc>
-                <a:tc>
-                  <a:txBody>
-                    <a:bodyPr/>
-                    <a:lstStyle/>
-                    <a:p>
-                      <a:pPr algn="ctr" rtl="1"/>
-                      <a:r>
-                        <a:rPr lang="en-US" dirty="0"/>
-                        <a:t>2</a:t>
-                      </a:r>
-                      <a:endParaRPr lang="he-IL" dirty="0"/>
-                    </a:p>
-                  </a:txBody>
-                  <a:tcPr anchor="ctr"/>
-                </a:tc>
-                <a:tc>
-                  <a:txBody>
-                    <a:bodyPr/>
-                    <a:lstStyle/>
-                    <a:p>
-                      <a:pPr algn="ctr" rtl="1"/>
-                      <a:r>
-                        <a:rPr lang="en-US" dirty="0"/>
-                        <a:t>1</a:t>
-                      </a:r>
-                      <a:endParaRPr lang="he-IL" dirty="0"/>
-                    </a:p>
-                  </a:txBody>
-                  <a:tcPr anchor="ctr"/>
-                </a:tc>
-                <a:tc>
-                  <a:txBody>
-                    <a:bodyPr/>
-                    <a:lstStyle/>
-                    <a:p>
-                      <a:pPr algn="ctr" rtl="1"/>
-                      <a:r>
-                        <a:rPr lang="en-US" noProof="0" dirty="0"/>
-                        <a:t>English</a:t>
-                      </a:r>
-                    </a:p>
-                  </a:txBody>
-                  <a:tcPr anchor="ctr"/>
-                </a:tc>
-                <a:extLst>
-                  <a:ext uri="{0D108BD9-81ED-4DB2-BD59-A6C34878D82A}">
-                    <a16:rowId xmlns:a16="http://schemas.microsoft.com/office/drawing/2014/main" val="157702110"/>
-                  </a:ext>
-                </a:extLst>
-              </a:tr>
-              <a:tr h="411636">
-                <a:tc gridSpan="6">
-                  <a:txBody>
-                    <a:bodyPr/>
-                    <a:lstStyle/>
-                    <a:p>
-                      <a:pPr algn="ctr" rtl="1"/>
-                      <a:endParaRPr lang="he-IL" dirty="0"/>
-                    </a:p>
-                  </a:txBody>
-                  <a:tcPr anchor="ctr"/>
-                </a:tc>
-                <a:tc hMerge="1">
-                  <a:txBody>
-                    <a:bodyPr/>
-                    <a:lstStyle/>
-                    <a:p>
-                      <a:pPr rtl="1"/>
-                      <a:endParaRPr lang="he-IL" dirty="0"/>
-                    </a:p>
-                  </a:txBody>
-                  <a:tcPr anchor="ctr"/>
-                </a:tc>
-                <a:tc hMerge="1">
-                  <a:txBody>
-                    <a:bodyPr/>
-                    <a:lstStyle/>
-                    <a:p>
-                      <a:pPr rtl="1"/>
-                      <a:endParaRPr lang="he-IL" dirty="0"/>
-                    </a:p>
-                  </a:txBody>
-                  <a:tcPr anchor="ctr"/>
-                </a:tc>
-                <a:tc hMerge="1">
-                  <a:txBody>
-                    <a:bodyPr/>
-                    <a:lstStyle/>
-                    <a:p>
-                      <a:pPr rtl="1"/>
-                      <a:endParaRPr lang="he-IL" dirty="0"/>
-                    </a:p>
-                  </a:txBody>
-                  <a:tcPr anchor="ctr"/>
-                </a:tc>
-                <a:tc hMerge="1">
-                  <a:txBody>
-                    <a:bodyPr/>
-                    <a:lstStyle/>
-                    <a:p>
-                      <a:pPr rtl="1"/>
-                      <a:endParaRPr lang="he-IL" dirty="0"/>
-                    </a:p>
-                  </a:txBody>
-                  <a:tcPr anchor="ctr"/>
-                </a:tc>
-                <a:tc hMerge="1">
-                  <a:txBody>
-                    <a:bodyPr/>
-                    <a:lstStyle/>
-                    <a:p>
-                      <a:pPr rtl="1"/>
-                      <a:endParaRPr lang="he-IL" dirty="0"/>
-                    </a:p>
-                  </a:txBody>
-                  <a:tcPr anchor="ctr"/>
-                </a:tc>
-                <a:tc>
-                  <a:txBody>
-                    <a:bodyPr/>
-                    <a:lstStyle/>
-                    <a:p>
-                      <a:pPr algn="ctr" rtl="1"/>
-                      <a:r>
-                        <a:rPr lang="en-US" dirty="0"/>
-                        <a:t>1</a:t>
-                      </a:r>
+              <a:tr h="725019">
+                <a:tc>
+                  <a:txBody>
+                    <a:bodyPr/>
+                    <a:lstStyle/>
+                    <a:p>
+                      <a:pPr algn="ctr" rtl="1"/>
+                      <a:endParaRPr lang="he-IL" dirty="0"/>
+                    </a:p>
+                  </a:txBody>
+                  <a:tcPr anchor="ctr"/>
+                </a:tc>
+                <a:tc>
+                  <a:txBody>
+                    <a:bodyPr/>
+                    <a:lstStyle/>
+                    <a:p>
+                      <a:pPr algn="ctr" rtl="1"/>
+                      <a:endParaRPr lang="he-IL" dirty="0"/>
+                    </a:p>
+                  </a:txBody>
+                  <a:tcPr anchor="ctr"/>
+                </a:tc>
+                <a:tc>
+                  <a:txBody>
+                    <a:bodyPr/>
+                    <a:lstStyle/>
+                    <a:p>
+                      <a:pPr algn="ctr" rtl="1"/>
+                      <a:endParaRPr lang="he-IL" dirty="0"/>
+                    </a:p>
+                  </a:txBody>
+                  <a:tcPr anchor="ctr"/>
+                </a:tc>
+                <a:tc>
+                  <a:txBody>
+                    <a:bodyPr/>
+                    <a:lstStyle/>
+                    <a:p>
+                      <a:pPr algn="ctr" rtl="1"/>
+                      <a:endParaRPr lang="he-IL" dirty="0"/>
+                    </a:p>
+                  </a:txBody>
+                  <a:tcPr anchor="ctr"/>
+                </a:tc>
+                <a:tc>
+                  <a:txBody>
+                    <a:bodyPr/>
+                    <a:lstStyle/>
+                    <a:p>
+                      <a:pPr algn="ctr" rtl="1"/>
+                      <a:endParaRPr lang="he-IL" dirty="0"/>
+                    </a:p>
+                  </a:txBody>
+                  <a:tcPr anchor="ctr"/>
+                </a:tc>
+                <a:tc>
+                  <a:txBody>
+                    <a:bodyPr/>
+                    <a:lstStyle/>
+                    <a:p>
+                      <a:pPr algn="ctr" rtl="1"/>
                       <a:endParaRPr lang="he-IL" dirty="0"/>
                     </a:p>
                   </a:txBody>
@@ -4631,19 +4498,19 @@
                   </a:ext>
                 </a:extLst>
               </a:tr>
-              <a:tr h="411636">
-                <a:tc rowSpan="3">
-                  <a:txBody>
-                    <a:bodyPr/>
-                    <a:lstStyle/>
-                    <a:p>
-                      <a:pPr algn="ctr" rtl="1"/>
-                      <a:endParaRPr lang="he-IL" dirty="0"/>
-                    </a:p>
-                  </a:txBody>
-                  <a:tcPr anchor="ctr"/>
-                </a:tc>
-                <a:tc rowSpan="2">
+              <a:tr h="988212">
+                <a:tc>
+                  <a:txBody>
+                    <a:bodyPr/>
+                    <a:lstStyle/>
+                    <a:p>
+                      <a:pPr algn="ctr" rtl="1"/>
+                      <a:endParaRPr lang="he-IL" dirty="0"/>
+                    </a:p>
+                  </a:txBody>
+                  <a:tcPr anchor="ctr"/>
+                </a:tc>
+                <a:tc>
                   <a:txBody>
                     <a:bodyPr/>
                     <a:lstStyle/>
@@ -4658,7 +4525,7 @@
                   </a:txBody>
                   <a:tcPr anchor="ctr"/>
                 </a:tc>
-                <a:tc rowSpan="3">
+                <a:tc rowSpan="2">
                   <a:txBody>
                     <a:bodyPr/>
                     <a:lstStyle/>
@@ -4707,27 +4574,12 @@
                   </a:txBody>
                   <a:tcPr anchor="ctr"/>
                 </a:tc>
-                <a:tc rowSpan="3">
-                  <a:txBody>
-                    <a:bodyPr/>
-                    <a:lstStyle/>
-                    <a:p>
-                      <a:pPr algn="ctr" rtl="1"/>
-                      <a:endParaRPr lang="he-IL" dirty="0"/>
-                    </a:p>
-                  </a:txBody>
-                  <a:tcPr anchor="ctr"/>
-                </a:tc>
-                <a:tc>
-                  <a:txBody>
-                    <a:bodyPr/>
-                    <a:lstStyle/>
-                    <a:p>
-                      <a:pPr algn="ctr" rtl="1"/>
-                      <a:r>
-                        <a:rPr lang="en-US" dirty="0"/>
-                        <a:t>2</a:t>
-                      </a:r>
+                <a:tc>
+                  <a:txBody>
+                    <a:bodyPr/>
+                    <a:lstStyle/>
+                    <a:p>
+                      <a:pPr algn="ctr" rtl="1"/>
                       <a:endParaRPr lang="he-IL" dirty="0"/>
                     </a:p>
                   </a:txBody>
@@ -4739,59 +4591,64 @@
                   </a:ext>
                 </a:extLst>
               </a:tr>
-              <a:tr h="149430">
+              <a:tr h="988212">
+                <a:tc>
+                  <a:txBody>
+                    <a:bodyPr/>
+                    <a:lstStyle/>
+                    <a:p>
+                      <a:pPr algn="ctr" rtl="1"/>
+                      <a:endParaRPr lang="he-IL" dirty="0"/>
+                    </a:p>
+                  </a:txBody>
+                  <a:tcPr anchor="ctr"/>
+                </a:tc>
+                <a:tc>
+                  <a:txBody>
+                    <a:bodyPr/>
+                    <a:lstStyle/>
+                    <a:p>
+                      <a:pPr algn="ctr" rtl="1"/>
+                      <a:r>
+                        <a:rPr lang="en-US" dirty="0"/>
+                        <a:t>p</a:t>
+                      </a:r>
+                      <a:endParaRPr lang="he-IL" dirty="0"/>
+                    </a:p>
+                  </a:txBody>
+                  <a:tcPr anchor="ctr"/>
+                </a:tc>
                 <a:tc vMerge="1">
                   <a:txBody>
                     <a:bodyPr/>
                     <a:lstStyle/>
                     <a:p>
-                      <a:pPr algn="ctr" rtl="1"/>
-                      <a:endParaRPr lang="he-IL" dirty="0"/>
+                      <a:pPr rtl="1"/>
+                      <a:endParaRPr lang="he-IL"/>
                     </a:p>
                   </a:txBody>
                   <a:tcPr/>
                 </a:tc>
-                <a:tc vMerge="1">
-                  <a:txBody>
-                    <a:bodyPr/>
-                    <a:lstStyle/>
-                    <a:p>
-                      <a:pPr algn="ctr" rtl="1"/>
-                      <a:endParaRPr lang="he-IL" dirty="0"/>
-                    </a:p>
-                  </a:txBody>
-                  <a:tcPr/>
-                </a:tc>
-                <a:tc vMerge="1">
-                  <a:txBody>
-                    <a:bodyPr/>
-                    <a:lstStyle/>
-                    <a:p>
-                      <a:endParaRPr dirty="0"/>
-                    </a:p>
-                  </a:txBody>
-                  <a:tcPr anchor="ctr"/>
-                </a:tc>
-                <a:tc rowSpan="2">
+                <a:tc>
                   <a:txBody>
                     <a:bodyPr/>
                     <a:lstStyle/>
                     <a:p>
                       <a:pPr algn="ctr" rtl="1"/>
                       <a:r>
-                        <a:rPr lang="en-US" dirty="0">
+                        <a:rPr lang="en-US">
                           <a:solidFill>
                             <a:schemeClr val="tx1"/>
                           </a:solidFill>
                         </a:rPr>
                         <a:t>Rating</a:t>
                       </a:r>
-                      <a:endParaRPr lang="he-IL" dirty="0"/>
-                    </a:p>
-                  </a:txBody>
-                  <a:tcPr anchor="ctr"/>
-                </a:tc>
-                <a:tc rowSpan="2">
+                      <a:endParaRPr lang="he-IL"/>
+                    </a:p>
+                  </a:txBody>
+                  <a:tcPr anchor="ctr"/>
+                </a:tc>
+                <a:tc>
                   <a:txBody>
                     <a:bodyPr/>
                     <a:lstStyle/>
@@ -4806,119 +4663,16 @@
                   </a:txBody>
                   <a:tcPr anchor="ctr"/>
                 </a:tc>
-                <a:tc vMerge="1">
-                  <a:txBody>
-                    <a:bodyPr/>
-                    <a:lstStyle/>
-                    <a:p>
-                      <a:pPr algn="ctr" rtl="1"/>
-                      <a:endParaRPr lang="he-IL" dirty="0"/>
-                    </a:p>
-                  </a:txBody>
-                  <a:tcPr/>
-                </a:tc>
-                <a:tc rowSpan="2">
-                  <a:txBody>
-                    <a:bodyPr/>
-                    <a:lstStyle/>
-                    <a:p>
-                      <a:pPr algn="ctr" rtl="1"/>
-                      <a:r>
-                        <a:rPr lang="en-US" dirty="0"/>
-                        <a:t>3</a:t>
-                      </a:r>
-                      <a:endParaRPr lang="he-IL" dirty="0"/>
-                    </a:p>
-                  </a:txBody>
-                  <a:tcPr anchor="ctr"/>
-                </a:tc>
-                <a:extLst>
-                  <a:ext uri="{0D108BD9-81ED-4DB2-BD59-A6C34878D82A}">
-                    <a16:rowId xmlns:a16="http://schemas.microsoft.com/office/drawing/2014/main" val="651198522"/>
-                  </a:ext>
-                </a:extLst>
-              </a:tr>
-              <a:tr h="561066">
-                <a:tc vMerge="1">
-                  <a:txBody>
-                    <a:bodyPr/>
-                    <a:lstStyle/>
-                    <a:p>
-                      <a:pPr rtl="1"/>
-                      <a:endParaRPr lang="he-IL"/>
-                    </a:p>
-                  </a:txBody>
-                  <a:tcPr/>
-                </a:tc>
-                <a:tc>
-                  <a:txBody>
-                    <a:bodyPr/>
-                    <a:lstStyle/>
-                    <a:p>
-                      <a:pPr algn="ctr" rtl="1"/>
-                      <a:r>
-                        <a:rPr lang="en-US" dirty="0"/>
-                        <a:t>p</a:t>
-                      </a:r>
-                      <a:endParaRPr lang="he-IL" dirty="0"/>
-                    </a:p>
-                  </a:txBody>
-                  <a:tcPr anchor="ctr"/>
-                </a:tc>
-                <a:tc vMerge="1">
-                  <a:txBody>
-                    <a:bodyPr/>
-                    <a:lstStyle/>
-                    <a:p>
-                      <a:pPr rtl="1"/>
-                      <a:endParaRPr lang="he-IL"/>
-                    </a:p>
-                  </a:txBody>
-                  <a:tcPr/>
-                </a:tc>
-                <a:tc vMerge="1">
-                  <a:txBody>
-                    <a:bodyPr/>
-                    <a:lstStyle/>
-                    <a:p>
-                      <a:pPr rtl="1"/>
-                      <a:endParaRPr lang="he-IL"/>
-                    </a:p>
-                  </a:txBody>
-                  <a:tcPr/>
-                </a:tc>
-                <a:tc vMerge="1">
-                  <a:txBody>
-                    <a:bodyPr/>
-                    <a:lstStyle/>
-                    <a:p>
-                      <a:pPr rtl="1"/>
-                      <a:endParaRPr lang="he-IL"/>
-                    </a:p>
-                  </a:txBody>
-                  <a:tcPr/>
-                </a:tc>
-                <a:tc vMerge="1">
-                  <a:txBody>
-                    <a:bodyPr/>
-                    <a:lstStyle/>
-                    <a:p>
-                      <a:pPr rtl="1"/>
-                      <a:endParaRPr lang="he-IL"/>
-                    </a:p>
-                  </a:txBody>
-                  <a:tcPr/>
-                </a:tc>
-                <a:tc vMerge="1">
-                  <a:txBody>
-                    <a:bodyPr/>
-                    <a:lstStyle/>
-                    <a:p>
-                      <a:pPr rtl="1"/>
-                      <a:endParaRPr lang="he-IL"/>
-                    </a:p>
-                  </a:txBody>
-                  <a:tcPr/>
+                <a:tc>
+                  <a:txBody>
+                    <a:bodyPr/>
+                    <a:lstStyle/>
+                    <a:p>
+                      <a:pPr algn="ctr" rtl="1"/>
+                      <a:endParaRPr lang="he-IL" dirty="0"/>
+                    </a:p>
+                  </a:txBody>
+                  <a:tcPr anchor="ctr"/>
                 </a:tc>
                 <a:extLst>
                   <a:ext uri="{0D108BD9-81ED-4DB2-BD59-A6C34878D82A}">
@@ -4926,83 +4680,68 @@
                   </a:ext>
                 </a:extLst>
               </a:tr>
-              <a:tr h="411636">
-                <a:tc gridSpan="6">
-                  <a:txBody>
-                    <a:bodyPr/>
-                    <a:lstStyle/>
-                    <a:p>
-                      <a:pPr algn="ctr" rtl="1"/>
-                      <a:endParaRPr lang="he-IL" dirty="0"/>
-                    </a:p>
-                  </a:txBody>
-                  <a:tcPr anchor="ctr"/>
-                </a:tc>
-                <a:tc hMerge="1">
-                  <a:txBody>
-                    <a:bodyPr/>
-                    <a:lstStyle/>
-                    <a:p>
-                      <a:pPr rtl="1"/>
-                      <a:endParaRPr lang="he-IL"/>
-                    </a:p>
-                  </a:txBody>
-                  <a:tcPr/>
-                </a:tc>
-                <a:tc hMerge="1">
-                  <a:txBody>
-                    <a:bodyPr/>
-                    <a:lstStyle/>
-                    <a:p>
-                      <a:pPr rtl="1"/>
-                      <a:endParaRPr lang="he-IL"/>
-                    </a:p>
-                  </a:txBody>
-                  <a:tcPr/>
-                </a:tc>
-                <a:tc hMerge="1">
-                  <a:txBody>
-                    <a:bodyPr/>
-                    <a:lstStyle/>
-                    <a:p>
-                      <a:pPr rtl="1"/>
-                      <a:endParaRPr lang="he-IL"/>
-                    </a:p>
-                  </a:txBody>
-                  <a:tcPr/>
-                </a:tc>
-                <a:tc hMerge="1">
-                  <a:txBody>
-                    <a:bodyPr/>
-                    <a:lstStyle/>
-                    <a:p>
-                      <a:pPr rtl="1"/>
-                      <a:endParaRPr lang="he-IL" dirty="0"/>
-                    </a:p>
-                  </a:txBody>
-                  <a:tcPr/>
-                </a:tc>
-                <a:tc hMerge="1">
-                  <a:txBody>
-                    <a:bodyPr/>
-                    <a:lstStyle/>
-                    <a:p>
-                      <a:pPr rtl="1"/>
-                      <a:endParaRPr lang="he-IL" dirty="0"/>
-                    </a:p>
-                  </a:txBody>
-                  <a:tcPr/>
-                </a:tc>
-                <a:tc>
-                  <a:txBody>
-                    <a:bodyPr/>
-                    <a:lstStyle/>
-                    <a:p>
-                      <a:pPr algn="ctr" rtl="1"/>
-                      <a:r>
-                        <a:rPr lang="en-US" dirty="0"/>
-                        <a:t>4</a:t>
-                      </a:r>
+              <a:tr h="725019">
+                <a:tc>
+                  <a:txBody>
+                    <a:bodyPr/>
+                    <a:lstStyle/>
+                    <a:p>
+                      <a:pPr algn="ctr" rtl="1"/>
+                      <a:endParaRPr lang="he-IL" dirty="0"/>
+                    </a:p>
+                  </a:txBody>
+                  <a:tcPr anchor="ctr"/>
+                </a:tc>
+                <a:tc>
+                  <a:txBody>
+                    <a:bodyPr/>
+                    <a:lstStyle/>
+                    <a:p>
+                      <a:pPr algn="ctr" rtl="1"/>
+                      <a:endParaRPr lang="he-IL" dirty="0"/>
+                    </a:p>
+                  </a:txBody>
+                  <a:tcPr anchor="ctr"/>
+                </a:tc>
+                <a:tc>
+                  <a:txBody>
+                    <a:bodyPr/>
+                    <a:lstStyle/>
+                    <a:p>
+                      <a:pPr algn="ctr" rtl="1"/>
+                      <a:endParaRPr lang="he-IL" dirty="0"/>
+                    </a:p>
+                  </a:txBody>
+                  <a:tcPr anchor="ctr"/>
+                </a:tc>
+                <a:tc>
+                  <a:txBody>
+                    <a:bodyPr/>
+                    <a:lstStyle/>
+                    <a:p>
+                      <a:pPr algn="ctr" rtl="1"/>
+                      <a:endParaRPr lang="he-IL" dirty="0"/>
+                    </a:p>
+                  </a:txBody>
+                  <a:tcPr anchor="ctr"/>
+                </a:tc>
+                <a:tc>
+                  <a:txBody>
+                    <a:bodyPr/>
+                    <a:lstStyle/>
+                    <a:p>
+                      <a:pPr algn="ctr" rtl="1"/>
+                      <a:endParaRPr lang="he-IL" dirty="0"/>
+                    </a:p>
+                  </a:txBody>
+                  <a:tcPr anchor="ctr"/>
+                </a:tc>
+                <a:tc>
+                  <a:txBody>
+                    <a:bodyPr/>
+                    <a:lstStyle/>
+                    <a:p>
+                      <a:pPr algn="ctr" rtl="1"/>
                       <a:endParaRPr lang="he-IL" dirty="0"/>
                     </a:p>
                   </a:txBody>
@@ -5051,6 +4790,556 @@
               <a:t>English Version</a:t>
             </a:r>
             <a:endParaRPr lang="he-IL" sz="7000" b="1" u="sng" dirty="0"/>
+          </a:p>
+        </p:txBody>
+      </p:sp>
+      <p:sp>
+        <p:nvSpPr>
+          <p:cNvPr id="6" name="מלבן 5">
+            <a:extLst>
+              <a:ext uri="{FF2B5EF4-FFF2-40B4-BE49-F238E27FC236}">
+                <a16:creationId xmlns:a16="http://schemas.microsoft.com/office/drawing/2014/main" id="{21E41139-5CF4-101B-406A-7521B805C65E}"/>
+              </a:ext>
+            </a:extLst>
+          </p:cNvPr>
+          <p:cNvSpPr/>
+          <p:nvPr/>
+        </p:nvSpPr>
+        <p:spPr>
+          <a:xfrm>
+            <a:off x="1107521" y="1605786"/>
+            <a:ext cx="228600" cy="301752"/>
+          </a:xfrm>
+          <a:prstGeom prst="rect">
+            <a:avLst/>
+          </a:prstGeom>
+        </p:spPr>
+        <p:style>
+          <a:lnRef idx="2">
+            <a:schemeClr val="accent1">
+              <a:shade val="15000"/>
+            </a:schemeClr>
+          </a:lnRef>
+          <a:fillRef idx="1">
+            <a:schemeClr val="accent1"/>
+          </a:fillRef>
+          <a:effectRef idx="0">
+            <a:schemeClr val="accent1"/>
+          </a:effectRef>
+          <a:fontRef idx="minor">
+            <a:schemeClr val="lt1"/>
+          </a:fontRef>
+        </p:style>
+        <p:txBody>
+          <a:bodyPr rtlCol="1" anchor="ctr"/>
+          <a:lstStyle/>
+          <a:p>
+            <a:pPr algn="ctr"/>
+            <a:r>
+              <a:rPr lang="en-US" dirty="0"/>
+              <a:t>1</a:t>
+            </a:r>
+            <a:endParaRPr lang="he-IL" dirty="0"/>
+          </a:p>
+        </p:txBody>
+      </p:sp>
+      <p:sp>
+        <p:nvSpPr>
+          <p:cNvPr id="7" name="מלבן 6">
+            <a:extLst>
+              <a:ext uri="{FF2B5EF4-FFF2-40B4-BE49-F238E27FC236}">
+                <a16:creationId xmlns:a16="http://schemas.microsoft.com/office/drawing/2014/main" id="{8F36C2BA-6042-180E-0617-6C97E506E748}"/>
+              </a:ext>
+            </a:extLst>
+          </p:cNvPr>
+          <p:cNvSpPr/>
+          <p:nvPr/>
+        </p:nvSpPr>
+        <p:spPr>
+          <a:xfrm>
+            <a:off x="2886403" y="1605786"/>
+            <a:ext cx="228600" cy="301752"/>
+          </a:xfrm>
+          <a:prstGeom prst="rect">
+            <a:avLst/>
+          </a:prstGeom>
+        </p:spPr>
+        <p:style>
+          <a:lnRef idx="2">
+            <a:schemeClr val="accent1">
+              <a:shade val="15000"/>
+            </a:schemeClr>
+          </a:lnRef>
+          <a:fillRef idx="1">
+            <a:schemeClr val="accent1"/>
+          </a:fillRef>
+          <a:effectRef idx="0">
+            <a:schemeClr val="accent1"/>
+          </a:effectRef>
+          <a:fontRef idx="minor">
+            <a:schemeClr val="lt1"/>
+          </a:fontRef>
+        </p:style>
+        <p:txBody>
+          <a:bodyPr rtlCol="1" anchor="ctr"/>
+          <a:lstStyle/>
+          <a:p>
+            <a:pPr algn="ctr"/>
+            <a:r>
+              <a:rPr lang="en-US" dirty="0"/>
+              <a:t>2</a:t>
+            </a:r>
+            <a:endParaRPr lang="he-IL" dirty="0"/>
+          </a:p>
+        </p:txBody>
+      </p:sp>
+      <p:sp>
+        <p:nvSpPr>
+          <p:cNvPr id="8" name="מלבן 7">
+            <a:extLst>
+              <a:ext uri="{FF2B5EF4-FFF2-40B4-BE49-F238E27FC236}">
+                <a16:creationId xmlns:a16="http://schemas.microsoft.com/office/drawing/2014/main" id="{B4C73DCF-060E-4A24-E9D8-4C13FA64F742}"/>
+              </a:ext>
+            </a:extLst>
+          </p:cNvPr>
+          <p:cNvSpPr/>
+          <p:nvPr/>
+        </p:nvSpPr>
+        <p:spPr>
+          <a:xfrm>
+            <a:off x="4396635" y="1605786"/>
+            <a:ext cx="228600" cy="301752"/>
+          </a:xfrm>
+          <a:prstGeom prst="rect">
+            <a:avLst/>
+          </a:prstGeom>
+        </p:spPr>
+        <p:style>
+          <a:lnRef idx="2">
+            <a:schemeClr val="accent1">
+              <a:shade val="15000"/>
+            </a:schemeClr>
+          </a:lnRef>
+          <a:fillRef idx="1">
+            <a:schemeClr val="accent1"/>
+          </a:fillRef>
+          <a:effectRef idx="0">
+            <a:schemeClr val="accent1"/>
+          </a:effectRef>
+          <a:fontRef idx="minor">
+            <a:schemeClr val="lt1"/>
+          </a:fontRef>
+        </p:style>
+        <p:txBody>
+          <a:bodyPr rtlCol="1" anchor="ctr"/>
+          <a:lstStyle/>
+          <a:p>
+            <a:pPr algn="ctr"/>
+            <a:r>
+              <a:rPr lang="en-US" dirty="0"/>
+              <a:t>3</a:t>
+            </a:r>
+            <a:endParaRPr lang="he-IL" dirty="0"/>
+          </a:p>
+        </p:txBody>
+      </p:sp>
+      <p:sp>
+        <p:nvSpPr>
+          <p:cNvPr id="9" name="מלבן 8">
+            <a:extLst>
+              <a:ext uri="{FF2B5EF4-FFF2-40B4-BE49-F238E27FC236}">
+                <a16:creationId xmlns:a16="http://schemas.microsoft.com/office/drawing/2014/main" id="{8E30BBD8-6B99-35E1-43A8-78D618D4970B}"/>
+              </a:ext>
+            </a:extLst>
+          </p:cNvPr>
+          <p:cNvSpPr/>
+          <p:nvPr/>
+        </p:nvSpPr>
+        <p:spPr>
+          <a:xfrm>
+            <a:off x="5981700" y="1605786"/>
+            <a:ext cx="228600" cy="301752"/>
+          </a:xfrm>
+          <a:prstGeom prst="rect">
+            <a:avLst/>
+          </a:prstGeom>
+        </p:spPr>
+        <p:style>
+          <a:lnRef idx="2">
+            <a:schemeClr val="accent1">
+              <a:shade val="15000"/>
+            </a:schemeClr>
+          </a:lnRef>
+          <a:fillRef idx="1">
+            <a:schemeClr val="accent1"/>
+          </a:fillRef>
+          <a:effectRef idx="0">
+            <a:schemeClr val="accent1"/>
+          </a:effectRef>
+          <a:fontRef idx="minor">
+            <a:schemeClr val="lt1"/>
+          </a:fontRef>
+        </p:style>
+        <p:txBody>
+          <a:bodyPr rtlCol="1" anchor="ctr"/>
+          <a:lstStyle/>
+          <a:p>
+            <a:pPr algn="ctr"/>
+            <a:r>
+              <a:rPr lang="en-US" dirty="0"/>
+              <a:t>4</a:t>
+            </a:r>
+            <a:endParaRPr lang="he-IL" dirty="0"/>
+          </a:p>
+        </p:txBody>
+      </p:sp>
+      <p:sp>
+        <p:nvSpPr>
+          <p:cNvPr id="10" name="מלבן 9">
+            <a:extLst>
+              <a:ext uri="{FF2B5EF4-FFF2-40B4-BE49-F238E27FC236}">
+                <a16:creationId xmlns:a16="http://schemas.microsoft.com/office/drawing/2014/main" id="{9E7FF21B-ECD1-50AA-CAE8-F49376324F33}"/>
+              </a:ext>
+            </a:extLst>
+          </p:cNvPr>
+          <p:cNvSpPr/>
+          <p:nvPr/>
+        </p:nvSpPr>
+        <p:spPr>
+          <a:xfrm>
+            <a:off x="7566765" y="1605786"/>
+            <a:ext cx="228600" cy="301752"/>
+          </a:xfrm>
+          <a:prstGeom prst="rect">
+            <a:avLst/>
+          </a:prstGeom>
+        </p:spPr>
+        <p:style>
+          <a:lnRef idx="2">
+            <a:schemeClr val="accent1">
+              <a:shade val="15000"/>
+            </a:schemeClr>
+          </a:lnRef>
+          <a:fillRef idx="1">
+            <a:schemeClr val="accent1"/>
+          </a:fillRef>
+          <a:effectRef idx="0">
+            <a:schemeClr val="accent1"/>
+          </a:effectRef>
+          <a:fontRef idx="minor">
+            <a:schemeClr val="lt1"/>
+          </a:fontRef>
+        </p:style>
+        <p:txBody>
+          <a:bodyPr rtlCol="1" anchor="ctr"/>
+          <a:lstStyle/>
+          <a:p>
+            <a:pPr algn="ctr"/>
+            <a:r>
+              <a:rPr lang="en-US" dirty="0"/>
+              <a:t>5</a:t>
+            </a:r>
+            <a:endParaRPr lang="he-IL" dirty="0"/>
+          </a:p>
+        </p:txBody>
+      </p:sp>
+      <p:sp>
+        <p:nvSpPr>
+          <p:cNvPr id="11" name="מלבן 10">
+            <a:extLst>
+              <a:ext uri="{FF2B5EF4-FFF2-40B4-BE49-F238E27FC236}">
+                <a16:creationId xmlns:a16="http://schemas.microsoft.com/office/drawing/2014/main" id="{B81F2711-62B0-4B41-2C4A-438E8A739DF9}"/>
+              </a:ext>
+            </a:extLst>
+          </p:cNvPr>
+          <p:cNvSpPr/>
+          <p:nvPr/>
+        </p:nvSpPr>
+        <p:spPr>
+          <a:xfrm>
+            <a:off x="9076997" y="1605786"/>
+            <a:ext cx="228600" cy="301752"/>
+          </a:xfrm>
+          <a:prstGeom prst="rect">
+            <a:avLst/>
+          </a:prstGeom>
+        </p:spPr>
+        <p:style>
+          <a:lnRef idx="2">
+            <a:schemeClr val="accent1">
+              <a:shade val="15000"/>
+            </a:schemeClr>
+          </a:lnRef>
+          <a:fillRef idx="1">
+            <a:schemeClr val="accent1"/>
+          </a:fillRef>
+          <a:effectRef idx="0">
+            <a:schemeClr val="accent1"/>
+          </a:effectRef>
+          <a:fontRef idx="minor">
+            <a:schemeClr val="lt1"/>
+          </a:fontRef>
+        </p:style>
+        <p:txBody>
+          <a:bodyPr rtlCol="1" anchor="ctr"/>
+          <a:lstStyle/>
+          <a:p>
+            <a:pPr algn="ctr"/>
+            <a:r>
+              <a:rPr lang="en-US" dirty="0"/>
+              <a:t>6</a:t>
+            </a:r>
+            <a:endParaRPr lang="he-IL" dirty="0"/>
+          </a:p>
+        </p:txBody>
+      </p:sp>
+      <p:sp>
+        <p:nvSpPr>
+          <p:cNvPr id="12" name="מלבן 11">
+            <a:extLst>
+              <a:ext uri="{FF2B5EF4-FFF2-40B4-BE49-F238E27FC236}">
+                <a16:creationId xmlns:a16="http://schemas.microsoft.com/office/drawing/2014/main" id="{210E7862-50BF-F8DF-67A2-4D73DD544BC6}"/>
+              </a:ext>
+            </a:extLst>
+          </p:cNvPr>
+          <p:cNvSpPr/>
+          <p:nvPr/>
+        </p:nvSpPr>
+        <p:spPr>
+          <a:xfrm>
+            <a:off x="10585029" y="1605786"/>
+            <a:ext cx="228600" cy="301752"/>
+          </a:xfrm>
+          <a:prstGeom prst="rect">
+            <a:avLst/>
+          </a:prstGeom>
+        </p:spPr>
+        <p:style>
+          <a:lnRef idx="2">
+            <a:schemeClr val="accent1">
+              <a:shade val="15000"/>
+            </a:schemeClr>
+          </a:lnRef>
+          <a:fillRef idx="1">
+            <a:schemeClr val="accent1"/>
+          </a:fillRef>
+          <a:effectRef idx="0">
+            <a:schemeClr val="accent1"/>
+          </a:effectRef>
+          <a:fontRef idx="minor">
+            <a:schemeClr val="lt1"/>
+          </a:fontRef>
+        </p:style>
+        <p:txBody>
+          <a:bodyPr rtlCol="1" anchor="ctr"/>
+          <a:lstStyle/>
+          <a:p>
+            <a:pPr algn="ctr"/>
+            <a:r>
+              <a:rPr lang="en-US" dirty="0"/>
+              <a:t>7</a:t>
+            </a:r>
+            <a:endParaRPr lang="he-IL" dirty="0"/>
+          </a:p>
+        </p:txBody>
+      </p:sp>
+      <p:sp>
+        <p:nvSpPr>
+          <p:cNvPr id="13" name="מלבן 12">
+            <a:extLst>
+              <a:ext uri="{FF2B5EF4-FFF2-40B4-BE49-F238E27FC236}">
+                <a16:creationId xmlns:a16="http://schemas.microsoft.com/office/drawing/2014/main" id="{CEDCCA33-104E-FAF2-4577-E4330E9339B4}"/>
+              </a:ext>
+            </a:extLst>
+          </p:cNvPr>
+          <p:cNvSpPr/>
+          <p:nvPr/>
+        </p:nvSpPr>
+        <p:spPr>
+          <a:xfrm>
+            <a:off x="1107521" y="2462274"/>
+            <a:ext cx="228600" cy="301752"/>
+          </a:xfrm>
+          <a:prstGeom prst="rect">
+            <a:avLst/>
+          </a:prstGeom>
+        </p:spPr>
+        <p:style>
+          <a:lnRef idx="2">
+            <a:schemeClr val="accent1">
+              <a:shade val="15000"/>
+            </a:schemeClr>
+          </a:lnRef>
+          <a:fillRef idx="1">
+            <a:schemeClr val="accent1"/>
+          </a:fillRef>
+          <a:effectRef idx="0">
+            <a:schemeClr val="accent1"/>
+          </a:effectRef>
+          <a:fontRef idx="minor">
+            <a:schemeClr val="lt1"/>
+          </a:fontRef>
+        </p:style>
+        <p:txBody>
+          <a:bodyPr rtlCol="1" anchor="ctr"/>
+          <a:lstStyle/>
+          <a:p>
+            <a:pPr algn="ctr"/>
+            <a:r>
+              <a:rPr lang="en-US" dirty="0"/>
+              <a:t>2</a:t>
+            </a:r>
+            <a:endParaRPr lang="he-IL" dirty="0"/>
+          </a:p>
+        </p:txBody>
+      </p:sp>
+      <p:sp>
+        <p:nvSpPr>
+          <p:cNvPr id="14" name="מלבן 13">
+            <a:extLst>
+              <a:ext uri="{FF2B5EF4-FFF2-40B4-BE49-F238E27FC236}">
+                <a16:creationId xmlns:a16="http://schemas.microsoft.com/office/drawing/2014/main" id="{CDCE52AA-AFA8-C938-8979-5276E6D53041}"/>
+              </a:ext>
+            </a:extLst>
+          </p:cNvPr>
+          <p:cNvSpPr/>
+          <p:nvPr/>
+        </p:nvSpPr>
+        <p:spPr>
+          <a:xfrm>
+            <a:off x="1107521" y="3503421"/>
+            <a:ext cx="228600" cy="301752"/>
+          </a:xfrm>
+          <a:prstGeom prst="rect">
+            <a:avLst/>
+          </a:prstGeom>
+        </p:spPr>
+        <p:style>
+          <a:lnRef idx="2">
+            <a:schemeClr val="accent1">
+              <a:shade val="15000"/>
+            </a:schemeClr>
+          </a:lnRef>
+          <a:fillRef idx="1">
+            <a:schemeClr val="accent1"/>
+          </a:fillRef>
+          <a:effectRef idx="0">
+            <a:schemeClr val="accent1"/>
+          </a:effectRef>
+          <a:fontRef idx="minor">
+            <a:schemeClr val="lt1"/>
+          </a:fontRef>
+        </p:style>
+        <p:txBody>
+          <a:bodyPr rtlCol="1" anchor="ctr"/>
+          <a:lstStyle/>
+          <a:p>
+            <a:pPr algn="ctr"/>
+            <a:r>
+              <a:rPr lang="en-US" dirty="0"/>
+              <a:t>3</a:t>
+            </a:r>
+            <a:endParaRPr lang="he-IL" dirty="0"/>
+          </a:p>
+        </p:txBody>
+      </p:sp>
+      <p:sp>
+        <p:nvSpPr>
+          <p:cNvPr id="15" name="מלבן 14">
+            <a:extLst>
+              <a:ext uri="{FF2B5EF4-FFF2-40B4-BE49-F238E27FC236}">
+                <a16:creationId xmlns:a16="http://schemas.microsoft.com/office/drawing/2014/main" id="{0847C22C-27AD-5DB9-B3A9-9442CBE38756}"/>
+              </a:ext>
+            </a:extLst>
+          </p:cNvPr>
+          <p:cNvSpPr/>
+          <p:nvPr/>
+        </p:nvSpPr>
+        <p:spPr>
+          <a:xfrm>
+            <a:off x="1107521" y="4393692"/>
+            <a:ext cx="228600" cy="301752"/>
+          </a:xfrm>
+          <a:prstGeom prst="rect">
+            <a:avLst/>
+          </a:prstGeom>
+        </p:spPr>
+        <p:style>
+          <a:lnRef idx="2">
+            <a:schemeClr val="accent1">
+              <a:shade val="15000"/>
+            </a:schemeClr>
+          </a:lnRef>
+          <a:fillRef idx="1">
+            <a:schemeClr val="accent1"/>
+          </a:fillRef>
+          <a:effectRef idx="0">
+            <a:schemeClr val="accent1"/>
+          </a:effectRef>
+          <a:fontRef idx="minor">
+            <a:schemeClr val="lt1"/>
+          </a:fontRef>
+        </p:style>
+        <p:txBody>
+          <a:bodyPr rtlCol="1" anchor="ctr"/>
+          <a:lstStyle/>
+          <a:p>
+            <a:pPr algn="ctr"/>
+            <a:r>
+              <a:rPr lang="en-US" dirty="0"/>
+              <a:t>4</a:t>
+            </a:r>
+            <a:endParaRPr lang="he-IL" dirty="0"/>
+          </a:p>
+        </p:txBody>
+      </p:sp>
+      <p:sp>
+        <p:nvSpPr>
+          <p:cNvPr id="16" name="מלבן 15">
+            <a:extLst>
+              <a:ext uri="{FF2B5EF4-FFF2-40B4-BE49-F238E27FC236}">
+                <a16:creationId xmlns:a16="http://schemas.microsoft.com/office/drawing/2014/main" id="{DED303BF-4E3A-9CE4-A62A-092B204E9F15}"/>
+              </a:ext>
+            </a:extLst>
+          </p:cNvPr>
+          <p:cNvSpPr/>
+          <p:nvPr/>
+        </p:nvSpPr>
+        <p:spPr>
+          <a:xfrm>
+            <a:off x="1107521" y="5216652"/>
+            <a:ext cx="228600" cy="301752"/>
+          </a:xfrm>
+          <a:prstGeom prst="rect">
+            <a:avLst/>
+          </a:prstGeom>
+        </p:spPr>
+        <p:style>
+          <a:lnRef idx="2">
+            <a:schemeClr val="accent1">
+              <a:shade val="15000"/>
+            </a:schemeClr>
+          </a:lnRef>
+          <a:fillRef idx="1">
+            <a:schemeClr val="accent1"/>
+          </a:fillRef>
+          <a:effectRef idx="0">
+            <a:schemeClr val="accent1"/>
+          </a:effectRef>
+          <a:fontRef idx="minor">
+            <a:schemeClr val="lt1"/>
+          </a:fontRef>
+        </p:style>
+        <p:txBody>
+          <a:bodyPr rtlCol="1" anchor="ctr"/>
+          <a:lstStyle/>
+          <a:p>
+            <a:pPr algn="ctr"/>
+            <a:r>
+              <a:rPr lang="en-US" dirty="0"/>
+              <a:t>5</a:t>
+            </a:r>
+            <a:endParaRPr lang="he-IL" dirty="0"/>
           </a:p>
         </p:txBody>
       </p:sp>
@@ -6351,14 +6640,14 @@
           <p:nvPr>
             <p:extLst>
               <p:ext uri="{D42A27DB-BD31-4B8C-83A1-F6EECF244321}">
-                <p14:modId xmlns:p14="http://schemas.microsoft.com/office/powerpoint/2010/main" val="1195801117"/>
+                <p14:modId xmlns:p14="http://schemas.microsoft.com/office/powerpoint/2010/main" val="2567200604"/>
               </p:ext>
             </p:extLst>
           </p:nvPr>
         </p:nvGraphicFramePr>
         <p:xfrm>
-          <a:off x="2032000" y="1760220"/>
-          <a:ext cx="8128000" cy="3606800"/>
+          <a:off x="1545580" y="1842512"/>
+          <a:ext cx="9624112" cy="4119368"/>
         </p:xfrm>
         <a:graphic>
           <a:graphicData uri="http://schemas.openxmlformats.org/drawingml/2006/table">
@@ -6367,179 +6656,75 @@
                 <a:tableStyleId>{BC89EF96-8CEA-46FF-86C4-4CE0E7609802}</a:tableStyleId>
               </a:tblPr>
               <a:tblGrid>
-                <a:gridCol w="1625600">
+                <a:gridCol w="2406028">
                   <a:extLst>
                     <a:ext uri="{9D8B030D-6E8A-4147-A177-3AD203B41FA5}">
                       <a16:colId xmlns:a16="http://schemas.microsoft.com/office/drawing/2014/main" val="3562599689"/>
                     </a:ext>
                   </a:extLst>
                 </a:gridCol>
-                <a:gridCol w="1625600">
+                <a:gridCol w="2406028">
                   <a:extLst>
                     <a:ext uri="{9D8B030D-6E8A-4147-A177-3AD203B41FA5}">
                       <a16:colId xmlns:a16="http://schemas.microsoft.com/office/drawing/2014/main" val="2390034552"/>
                     </a:ext>
                   </a:extLst>
                 </a:gridCol>
-                <a:gridCol w="1625600">
+                <a:gridCol w="2406028">
                   <a:extLst>
                     <a:ext uri="{9D8B030D-6E8A-4147-A177-3AD203B41FA5}">
                       <a16:colId xmlns:a16="http://schemas.microsoft.com/office/drawing/2014/main" val="2439500098"/>
                     </a:ext>
                   </a:extLst>
                 </a:gridCol>
-                <a:gridCol w="1625600">
+                <a:gridCol w="2406028">
                   <a:extLst>
                     <a:ext uri="{9D8B030D-6E8A-4147-A177-3AD203B41FA5}">
                       <a16:colId xmlns:a16="http://schemas.microsoft.com/office/drawing/2014/main" val="3855221628"/>
                     </a:ext>
                   </a:extLst>
                 </a:gridCol>
-                <a:gridCol w="1625600">
-                  <a:extLst>
-                    <a:ext uri="{9D8B030D-6E8A-4147-A177-3AD203B41FA5}">
-                      <a16:colId xmlns:a16="http://schemas.microsoft.com/office/drawing/2014/main" val="1311311664"/>
-                    </a:ext>
-                  </a:extLst>
-                </a:gridCol>
               </a:tblGrid>
-              <a:tr h="370840">
-                <a:tc>
-                  <a:txBody>
-                    <a:bodyPr/>
-                    <a:lstStyle/>
-                    <a:p>
-                      <a:pPr algn="ctr" rtl="1"/>
-                      <a:r>
-                        <a:rPr lang="en-US" dirty="0"/>
-                        <a:t>4</a:t>
-                      </a:r>
-                      <a:endParaRPr lang="he-IL" dirty="0"/>
-                    </a:p>
-                  </a:txBody>
-                  <a:tcPr anchor="ctr"/>
-                </a:tc>
-                <a:tc>
-                  <a:txBody>
-                    <a:bodyPr/>
-                    <a:lstStyle/>
-                    <a:p>
-                      <a:pPr algn="ctr" rtl="1"/>
-                      <a:r>
-                        <a:rPr lang="en-US" dirty="0"/>
-                        <a:t>3</a:t>
-                      </a:r>
-                      <a:endParaRPr lang="he-IL" dirty="0"/>
-                    </a:p>
-                  </a:txBody>
-                  <a:tcPr anchor="ctr"/>
-                </a:tc>
-                <a:tc>
-                  <a:txBody>
-                    <a:bodyPr/>
-                    <a:lstStyle/>
-                    <a:p>
-                      <a:pPr algn="ctr" rtl="1"/>
-                      <a:r>
-                        <a:rPr lang="en-US" dirty="0"/>
-                        <a:t>2</a:t>
-                      </a:r>
-                      <a:endParaRPr lang="he-IL" dirty="0"/>
-                    </a:p>
-                  </a:txBody>
-                  <a:tcPr anchor="ctr"/>
-                </a:tc>
-                <a:tc>
-                  <a:txBody>
-                    <a:bodyPr/>
-                    <a:lstStyle/>
-                    <a:p>
-                      <a:pPr algn="ctr" rtl="1"/>
-                      <a:r>
-                        <a:rPr lang="en-US" dirty="0"/>
-                        <a:t>1</a:t>
-                      </a:r>
-                      <a:endParaRPr lang="he-IL" dirty="0"/>
-                    </a:p>
-                  </a:txBody>
-                  <a:tcPr anchor="ctr"/>
-                </a:tc>
-                <a:tc>
-                  <a:txBody>
-                    <a:bodyPr/>
-                    <a:lstStyle/>
-                    <a:p>
-                      <a:pPr algn="ctr" rtl="1"/>
-                      <a:r>
-                        <a:rPr lang="en-US" dirty="0"/>
-                        <a:t>English Mobile</a:t>
-                      </a:r>
-                      <a:endParaRPr lang="he-IL" dirty="0"/>
-                    </a:p>
-                  </a:txBody>
-                  <a:tcPr anchor="ctr"/>
-                </a:tc>
-                <a:extLst>
-                  <a:ext uri="{0D108BD9-81ED-4DB2-BD59-A6C34878D82A}">
-                    <a16:rowId xmlns:a16="http://schemas.microsoft.com/office/drawing/2014/main" val="3273744787"/>
-                  </a:ext>
-                </a:extLst>
-              </a:tr>
-              <a:tr h="370840">
-                <a:tc gridSpan="4">
-                  <a:txBody>
-                    <a:bodyPr/>
-                    <a:lstStyle/>
-                    <a:p>
-                      <a:pPr algn="ctr" rtl="1"/>
-                      <a:endParaRPr lang="he-IL" dirty="0"/>
-                    </a:p>
-                  </a:txBody>
-                  <a:tcPr anchor="ctr"/>
-                </a:tc>
-                <a:tc hMerge="1">
-                  <a:txBody>
-                    <a:bodyPr/>
-                    <a:lstStyle/>
-                    <a:p>
-                      <a:pPr rtl="1"/>
-                      <a:endParaRPr lang="he-IL" dirty="0"/>
-                    </a:p>
-                  </a:txBody>
-                  <a:tcPr/>
-                </a:tc>
-                <a:tc hMerge="1">
-                  <a:txBody>
-                    <a:bodyPr/>
-                    <a:lstStyle/>
-                    <a:p>
-                      <a:pPr rtl="1"/>
-                      <a:endParaRPr lang="he-IL" dirty="0"/>
-                    </a:p>
-                  </a:txBody>
-                  <a:tcPr/>
-                </a:tc>
-                <a:tc hMerge="1">
-                  <a:txBody>
-                    <a:bodyPr/>
-                    <a:lstStyle/>
-                    <a:p>
-                      <a:pPr rtl="1"/>
-                      <a:endParaRPr lang="he-IL" dirty="0"/>
-                    </a:p>
-                  </a:txBody>
-                  <a:tcPr/>
-                </a:tc>
-                <a:tc>
-                  <a:txBody>
-                    <a:bodyPr/>
-                    <a:lstStyle/>
-                    <a:p>
-                      <a:pPr algn="ctr" rtl="1"/>
-                      <a:r>
-                        <a:rPr lang="en-US" dirty="0"/>
-                        <a:t>1</a:t>
-                      </a:r>
+              <a:tr h="514921">
+                <a:tc>
+                  <a:txBody>
+                    <a:bodyPr/>
+                    <a:lstStyle/>
+                    <a:p>
+                      <a:pPr algn="ctr" rtl="1"/>
+                      <a:endParaRPr lang="he-IL" dirty="0"/>
+                    </a:p>
+                  </a:txBody>
+                  <a:tcPr anchor="ctr"/>
+                </a:tc>
+                <a:tc>
+                  <a:txBody>
+                    <a:bodyPr/>
+                    <a:lstStyle/>
+                    <a:p>
+                      <a:pPr algn="ctr" rtl="1"/>
+                      <a:endParaRPr lang="he-IL" dirty="0"/>
+                    </a:p>
+                  </a:txBody>
+                  <a:tcPr anchor="ctr"/>
+                </a:tc>
+                <a:tc>
+                  <a:txBody>
+                    <a:bodyPr/>
+                    <a:lstStyle/>
+                    <a:p>
+                      <a:pPr algn="ctr" rtl="1"/>
+                      <a:endParaRPr lang="he-IL" dirty="0"/>
+                    </a:p>
+                  </a:txBody>
+                  <a:tcPr anchor="ctr"/>
+                </a:tc>
+                <a:tc>
+                  <a:txBody>
+                    <a:bodyPr/>
+                    <a:lstStyle/>
+                    <a:p>
+                      <a:pPr algn="ctr" rtl="1"/>
                       <a:endParaRPr lang="he-IL" dirty="0"/>
                     </a:p>
                   </a:txBody>
@@ -6551,8 +6736,8 @@
                   </a:ext>
                 </a:extLst>
               </a:tr>
-              <a:tr h="370840">
-                <a:tc rowSpan="6">
+              <a:tr h="514921">
+                <a:tc>
                   <a:txBody>
                     <a:bodyPr/>
                     <a:lstStyle/>
@@ -6593,27 +6778,12 @@
                   </a:txBody>
                   <a:tcPr anchor="ctr"/>
                 </a:tc>
-                <a:tc rowSpan="6">
-                  <a:txBody>
-                    <a:bodyPr/>
-                    <a:lstStyle/>
-                    <a:p>
-                      <a:pPr algn="ctr" rtl="1"/>
-                      <a:endParaRPr lang="he-IL" dirty="0"/>
-                    </a:p>
-                  </a:txBody>
-                  <a:tcPr anchor="ctr"/>
-                </a:tc>
-                <a:tc>
-                  <a:txBody>
-                    <a:bodyPr/>
-                    <a:lstStyle/>
-                    <a:p>
-                      <a:pPr algn="ctr" rtl="1"/>
-                      <a:r>
-                        <a:rPr lang="en-US" dirty="0"/>
-                        <a:t>2</a:t>
-                      </a:r>
+                <a:tc>
+                  <a:txBody>
+                    <a:bodyPr/>
+                    <a:lstStyle/>
+                    <a:p>
+                      <a:pPr algn="ctr" rtl="1"/>
                       <a:endParaRPr lang="he-IL" dirty="0"/>
                     </a:p>
                   </a:txBody>
@@ -6625,17 +6795,17 @@
                   </a:ext>
                 </a:extLst>
               </a:tr>
-              <a:tr h="370840">
-                <a:tc vMerge="1">
-                  <a:txBody>
-                    <a:bodyPr/>
-                    <a:lstStyle/>
-                    <a:p>
-                      <a:pPr rtl="1"/>
-                      <a:endParaRPr lang="he-IL" dirty="0"/>
-                    </a:p>
-                  </a:txBody>
-                  <a:tcPr/>
+              <a:tr h="514921">
+                <a:tc>
+                  <a:txBody>
+                    <a:bodyPr/>
+                    <a:lstStyle/>
+                    <a:p>
+                      <a:pPr algn="ctr" rtl="1"/>
+                      <a:endParaRPr lang="he-IL" dirty="0"/>
+                    </a:p>
+                  </a:txBody>
+                  <a:tcPr anchor="ctr"/>
                 </a:tc>
                 <a:tc vMerge="1">
                   <a:txBody>
@@ -6662,27 +6832,12 @@
                   </a:txBody>
                   <a:tcPr anchor="ctr"/>
                 </a:tc>
-                <a:tc vMerge="1">
-                  <a:txBody>
-                    <a:bodyPr/>
-                    <a:lstStyle/>
-                    <a:p>
-                      <a:pPr rtl="1"/>
-                      <a:endParaRPr lang="he-IL" dirty="0"/>
-                    </a:p>
-                  </a:txBody>
-                  <a:tcPr/>
-                </a:tc>
-                <a:tc>
-                  <a:txBody>
-                    <a:bodyPr/>
-                    <a:lstStyle/>
-                    <a:p>
-                      <a:pPr algn="ctr" rtl="1"/>
-                      <a:r>
-                        <a:rPr lang="en-US" dirty="0"/>
-                        <a:t>3</a:t>
-                      </a:r>
+                <a:tc>
+                  <a:txBody>
+                    <a:bodyPr/>
+                    <a:lstStyle/>
+                    <a:p>
+                      <a:pPr algn="ctr" rtl="1"/>
                       <a:endParaRPr lang="he-IL" dirty="0"/>
                     </a:p>
                   </a:txBody>
@@ -6694,17 +6849,17 @@
                   </a:ext>
                 </a:extLst>
               </a:tr>
-              <a:tr h="370840">
-                <a:tc vMerge="1">
-                  <a:txBody>
-                    <a:bodyPr/>
-                    <a:lstStyle/>
-                    <a:p>
-                      <a:pPr rtl="1"/>
-                      <a:endParaRPr lang="he-IL" dirty="0"/>
-                    </a:p>
-                  </a:txBody>
-                  <a:tcPr/>
+              <a:tr h="514921">
+                <a:tc>
+                  <a:txBody>
+                    <a:bodyPr/>
+                    <a:lstStyle/>
+                    <a:p>
+                      <a:pPr algn="ctr" rtl="1"/>
+                      <a:endParaRPr lang="he-IL" dirty="0"/>
+                    </a:p>
+                  </a:txBody>
+                  <a:tcPr anchor="ctr"/>
                 </a:tc>
                 <a:tc vMerge="1">
                   <a:txBody>
@@ -6731,27 +6886,12 @@
                   </a:txBody>
                   <a:tcPr anchor="ctr"/>
                 </a:tc>
-                <a:tc vMerge="1">
-                  <a:txBody>
-                    <a:bodyPr/>
-                    <a:lstStyle/>
-                    <a:p>
-                      <a:pPr rtl="1"/>
-                      <a:endParaRPr lang="he-IL" dirty="0"/>
-                    </a:p>
-                  </a:txBody>
-                  <a:tcPr/>
-                </a:tc>
-                <a:tc>
-                  <a:txBody>
-                    <a:bodyPr/>
-                    <a:lstStyle/>
-                    <a:p>
-                      <a:pPr algn="ctr" rtl="1"/>
-                      <a:r>
-                        <a:rPr lang="en-US" dirty="0"/>
-                        <a:t>4</a:t>
-                      </a:r>
+                <a:tc>
+                  <a:txBody>
+                    <a:bodyPr/>
+                    <a:lstStyle/>
+                    <a:p>
+                      <a:pPr algn="ctr" rtl="1"/>
                       <a:endParaRPr lang="he-IL" dirty="0"/>
                     </a:p>
                   </a:txBody>
@@ -6763,17 +6903,17 @@
                   </a:ext>
                 </a:extLst>
               </a:tr>
-              <a:tr h="370840">
-                <a:tc vMerge="1">
-                  <a:txBody>
-                    <a:bodyPr/>
-                    <a:lstStyle/>
-                    <a:p>
-                      <a:pPr rtl="1"/>
-                      <a:endParaRPr lang="he-IL" dirty="0"/>
-                    </a:p>
-                  </a:txBody>
-                  <a:tcPr/>
+              <a:tr h="514921">
+                <a:tc>
+                  <a:txBody>
+                    <a:bodyPr/>
+                    <a:lstStyle/>
+                    <a:p>
+                      <a:pPr algn="ctr" rtl="1"/>
+                      <a:endParaRPr lang="he-IL" dirty="0"/>
+                    </a:p>
+                  </a:txBody>
+                  <a:tcPr anchor="ctr"/>
                 </a:tc>
                 <a:tc vMerge="1">
                   <a:txBody>
@@ -6800,27 +6940,12 @@
                   </a:txBody>
                   <a:tcPr anchor="ctr"/>
                 </a:tc>
-                <a:tc vMerge="1">
-                  <a:txBody>
-                    <a:bodyPr/>
-                    <a:lstStyle/>
-                    <a:p>
-                      <a:pPr rtl="1"/>
-                      <a:endParaRPr lang="he-IL" dirty="0"/>
-                    </a:p>
-                  </a:txBody>
-                  <a:tcPr/>
-                </a:tc>
-                <a:tc>
-                  <a:txBody>
-                    <a:bodyPr/>
-                    <a:lstStyle/>
-                    <a:p>
-                      <a:pPr algn="ctr" rtl="1"/>
-                      <a:r>
-                        <a:rPr lang="en-US" dirty="0"/>
-                        <a:t>5</a:t>
-                      </a:r>
+                <a:tc>
+                  <a:txBody>
+                    <a:bodyPr/>
+                    <a:lstStyle/>
+                    <a:p>
+                      <a:pPr algn="ctr" rtl="1"/>
                       <a:endParaRPr lang="he-IL" dirty="0"/>
                     </a:p>
                   </a:txBody>
@@ -6832,17 +6957,17 @@
                   </a:ext>
                 </a:extLst>
               </a:tr>
-              <a:tr h="370840">
-                <a:tc vMerge="1">
-                  <a:txBody>
-                    <a:bodyPr/>
-                    <a:lstStyle/>
-                    <a:p>
-                      <a:pPr rtl="1"/>
-                      <a:endParaRPr lang="he-IL" dirty="0"/>
-                    </a:p>
-                  </a:txBody>
-                  <a:tcPr/>
+              <a:tr h="514921">
+                <a:tc>
+                  <a:txBody>
+                    <a:bodyPr/>
+                    <a:lstStyle/>
+                    <a:p>
+                      <a:pPr algn="ctr" rtl="1"/>
+                      <a:endParaRPr lang="he-IL" dirty="0"/>
+                    </a:p>
+                  </a:txBody>
+                  <a:tcPr anchor="ctr"/>
                 </a:tc>
                 <a:tc gridSpan="2">
                   <a:txBody>
@@ -6870,27 +6995,12 @@
                   </a:txBody>
                   <a:tcPr anchor="ctr"/>
                 </a:tc>
-                <a:tc vMerge="1">
-                  <a:txBody>
-                    <a:bodyPr/>
-                    <a:lstStyle/>
-                    <a:p>
-                      <a:pPr rtl="1"/>
-                      <a:endParaRPr lang="he-IL" dirty="0"/>
-                    </a:p>
-                  </a:txBody>
-                  <a:tcPr/>
-                </a:tc>
-                <a:tc>
-                  <a:txBody>
-                    <a:bodyPr/>
-                    <a:lstStyle/>
-                    <a:p>
-                      <a:pPr algn="ctr" rtl="1"/>
-                      <a:r>
-                        <a:rPr lang="en-US" dirty="0"/>
-                        <a:t>6</a:t>
-                      </a:r>
+                <a:tc>
+                  <a:txBody>
+                    <a:bodyPr/>
+                    <a:lstStyle/>
+                    <a:p>
+                      <a:pPr algn="ctr" rtl="1"/>
                       <a:endParaRPr lang="he-IL" dirty="0"/>
                     </a:p>
                   </a:txBody>
@@ -6902,17 +7012,17 @@
                   </a:ext>
                 </a:extLst>
               </a:tr>
-              <a:tr h="370840">
-                <a:tc vMerge="1">
-                  <a:txBody>
-                    <a:bodyPr/>
-                    <a:lstStyle/>
-                    <a:p>
-                      <a:pPr rtl="1"/>
-                      <a:endParaRPr lang="he-IL" dirty="0"/>
-                    </a:p>
-                  </a:txBody>
-                  <a:tcPr/>
+              <a:tr h="514921">
+                <a:tc>
+                  <a:txBody>
+                    <a:bodyPr/>
+                    <a:lstStyle/>
+                    <a:p>
+                      <a:pPr algn="ctr" rtl="1"/>
+                      <a:endParaRPr lang="he-IL" dirty="0"/>
+                    </a:p>
+                  </a:txBody>
+                  <a:tcPr anchor="ctr"/>
                 </a:tc>
                 <a:tc gridSpan="2">
                   <a:txBody>
@@ -6940,27 +7050,12 @@
                   </a:txBody>
                   <a:tcPr anchor="ctr"/>
                 </a:tc>
-                <a:tc vMerge="1">
-                  <a:txBody>
-                    <a:bodyPr/>
-                    <a:lstStyle/>
-                    <a:p>
-                      <a:pPr rtl="1"/>
-                      <a:endParaRPr lang="he-IL" dirty="0"/>
-                    </a:p>
-                  </a:txBody>
-                  <a:tcPr/>
-                </a:tc>
-                <a:tc>
-                  <a:txBody>
-                    <a:bodyPr/>
-                    <a:lstStyle/>
-                    <a:p>
-                      <a:pPr algn="ctr" rtl="1"/>
-                      <a:r>
-                        <a:rPr lang="en-US" dirty="0"/>
-                        <a:t>7</a:t>
-                      </a:r>
+                <a:tc>
+                  <a:txBody>
+                    <a:bodyPr/>
+                    <a:lstStyle/>
+                    <a:p>
+                      <a:pPr algn="ctr" rtl="1"/>
                       <a:endParaRPr lang="he-IL" dirty="0"/>
                     </a:p>
                   </a:txBody>
@@ -6972,61 +7067,46 @@
                   </a:ext>
                 </a:extLst>
               </a:tr>
-              <a:tr h="370840">
-                <a:tc gridSpan="4">
-                  <a:txBody>
-                    <a:bodyPr/>
-                    <a:lstStyle/>
-                    <a:p>
-                      <a:pPr algn="ctr" rtl="1"/>
-                      <a:endParaRPr lang="he-IL" dirty="0"/>
-                    </a:p>
-                  </a:txBody>
-                  <a:tcPr anchor="ctr"/>
-                </a:tc>
-                <a:tc hMerge="1">
-                  <a:txBody>
-                    <a:bodyPr/>
-                    <a:lstStyle/>
-                    <a:p>
-                      <a:pPr rtl="1"/>
-                      <a:endParaRPr lang="he-IL"/>
-                    </a:p>
-                  </a:txBody>
-                  <a:tcPr/>
-                </a:tc>
-                <a:tc hMerge="1">
-                  <a:txBody>
-                    <a:bodyPr/>
-                    <a:lstStyle/>
-                    <a:p>
-                      <a:pPr rtl="1"/>
-                      <a:endParaRPr lang="he-IL"/>
-                    </a:p>
-                  </a:txBody>
-                  <a:tcPr/>
-                </a:tc>
-                <a:tc hMerge="1">
-                  <a:txBody>
-                    <a:bodyPr/>
-                    <a:lstStyle/>
-                    <a:p>
-                      <a:pPr rtl="1"/>
-                      <a:endParaRPr lang="he-IL" dirty="0"/>
-                    </a:p>
-                  </a:txBody>
-                  <a:tcPr/>
-                </a:tc>
-                <a:tc>
-                  <a:txBody>
-                    <a:bodyPr/>
-                    <a:lstStyle/>
-                    <a:p>
-                      <a:pPr algn="ctr" rtl="1"/>
-                      <a:r>
-                        <a:rPr lang="en-US" dirty="0"/>
-                        <a:t>8</a:t>
-                      </a:r>
+              <a:tr h="514921">
+                <a:tc>
+                  <a:txBody>
+                    <a:bodyPr/>
+                    <a:lstStyle/>
+                    <a:p>
+                      <a:pPr algn="ctr" rtl="1"/>
+                      <a:endParaRPr lang="he-IL" dirty="0"/>
+                    </a:p>
+                  </a:txBody>
+                  <a:tcPr anchor="ctr"/>
+                </a:tc>
+                <a:tc>
+                  <a:txBody>
+                    <a:bodyPr/>
+                    <a:lstStyle/>
+                    <a:p>
+                      <a:pPr algn="ctr" rtl="1"/>
+                      <a:endParaRPr lang="he-IL" dirty="0"/>
+                    </a:p>
+                  </a:txBody>
+                  <a:tcPr anchor="ctr"/>
+                </a:tc>
+                <a:tc>
+                  <a:txBody>
+                    <a:bodyPr/>
+                    <a:lstStyle/>
+                    <a:p>
+                      <a:pPr algn="ctr" rtl="1"/>
+                      <a:endParaRPr lang="he-IL" dirty="0"/>
+                    </a:p>
+                  </a:txBody>
+                  <a:tcPr anchor="ctr"/>
+                </a:tc>
+                <a:tc>
+                  <a:txBody>
+                    <a:bodyPr/>
+                    <a:lstStyle/>
+                    <a:p>
+                      <a:pPr algn="ctr" rtl="1"/>
                       <a:endParaRPr lang="he-IL" dirty="0"/>
                     </a:p>
                   </a:txBody>
@@ -7042,6 +7122,656 @@
           </a:graphicData>
         </a:graphic>
       </p:graphicFrame>
+      <p:sp>
+        <p:nvSpPr>
+          <p:cNvPr id="3" name="מלבן 2">
+            <a:extLst>
+              <a:ext uri="{FF2B5EF4-FFF2-40B4-BE49-F238E27FC236}">
+                <a16:creationId xmlns:a16="http://schemas.microsoft.com/office/drawing/2014/main" id="{A2B8FE6F-5C6D-E3A4-0D9B-2D29BF461D23}"/>
+              </a:ext>
+            </a:extLst>
+          </p:cNvPr>
+          <p:cNvSpPr/>
+          <p:nvPr/>
+        </p:nvSpPr>
+        <p:spPr>
+          <a:xfrm>
+            <a:off x="1158240" y="1445050"/>
+            <a:ext cx="228600" cy="301752"/>
+          </a:xfrm>
+          <a:prstGeom prst="rect">
+            <a:avLst/>
+          </a:prstGeom>
+        </p:spPr>
+        <p:style>
+          <a:lnRef idx="2">
+            <a:schemeClr val="accent1">
+              <a:shade val="15000"/>
+            </a:schemeClr>
+          </a:lnRef>
+          <a:fillRef idx="1">
+            <a:schemeClr val="accent1"/>
+          </a:fillRef>
+          <a:effectRef idx="0">
+            <a:schemeClr val="accent1"/>
+          </a:effectRef>
+          <a:fontRef idx="minor">
+            <a:schemeClr val="lt1"/>
+          </a:fontRef>
+        </p:style>
+        <p:txBody>
+          <a:bodyPr rtlCol="1" anchor="ctr"/>
+          <a:lstStyle/>
+          <a:p>
+            <a:pPr algn="ctr"/>
+            <a:r>
+              <a:rPr lang="en-US" dirty="0"/>
+              <a:t>1</a:t>
+            </a:r>
+            <a:endParaRPr lang="he-IL" dirty="0"/>
+          </a:p>
+        </p:txBody>
+      </p:sp>
+      <p:sp>
+        <p:nvSpPr>
+          <p:cNvPr id="4" name="מלבן 3">
+            <a:extLst>
+              <a:ext uri="{FF2B5EF4-FFF2-40B4-BE49-F238E27FC236}">
+                <a16:creationId xmlns:a16="http://schemas.microsoft.com/office/drawing/2014/main" id="{8A73F155-2372-E260-8F28-14BAD391E52F}"/>
+              </a:ext>
+            </a:extLst>
+          </p:cNvPr>
+          <p:cNvSpPr/>
+          <p:nvPr/>
+        </p:nvSpPr>
+        <p:spPr>
+          <a:xfrm>
+            <a:off x="3772154" y="1444901"/>
+            <a:ext cx="228600" cy="301752"/>
+          </a:xfrm>
+          <a:prstGeom prst="rect">
+            <a:avLst/>
+          </a:prstGeom>
+        </p:spPr>
+        <p:style>
+          <a:lnRef idx="2">
+            <a:schemeClr val="accent1">
+              <a:shade val="15000"/>
+            </a:schemeClr>
+          </a:lnRef>
+          <a:fillRef idx="1">
+            <a:schemeClr val="accent1"/>
+          </a:fillRef>
+          <a:effectRef idx="0">
+            <a:schemeClr val="accent1"/>
+          </a:effectRef>
+          <a:fontRef idx="minor">
+            <a:schemeClr val="lt1"/>
+          </a:fontRef>
+        </p:style>
+        <p:txBody>
+          <a:bodyPr rtlCol="1" anchor="ctr"/>
+          <a:lstStyle/>
+          <a:p>
+            <a:pPr algn="ctr"/>
+            <a:r>
+              <a:rPr lang="en-US" dirty="0"/>
+              <a:t>2</a:t>
+            </a:r>
+            <a:endParaRPr lang="he-IL" dirty="0"/>
+          </a:p>
+        </p:txBody>
+      </p:sp>
+      <p:sp>
+        <p:nvSpPr>
+          <p:cNvPr id="6" name="מלבן 5">
+            <a:extLst>
+              <a:ext uri="{FF2B5EF4-FFF2-40B4-BE49-F238E27FC236}">
+                <a16:creationId xmlns:a16="http://schemas.microsoft.com/office/drawing/2014/main" id="{002D821D-AE9F-BF4A-D82F-323B02118C53}"/>
+              </a:ext>
+            </a:extLst>
+          </p:cNvPr>
+          <p:cNvSpPr/>
+          <p:nvPr/>
+        </p:nvSpPr>
+        <p:spPr>
+          <a:xfrm>
+            <a:off x="6129036" y="1444901"/>
+            <a:ext cx="228600" cy="301752"/>
+          </a:xfrm>
+          <a:prstGeom prst="rect">
+            <a:avLst/>
+          </a:prstGeom>
+        </p:spPr>
+        <p:style>
+          <a:lnRef idx="2">
+            <a:schemeClr val="accent1">
+              <a:shade val="15000"/>
+            </a:schemeClr>
+          </a:lnRef>
+          <a:fillRef idx="1">
+            <a:schemeClr val="accent1"/>
+          </a:fillRef>
+          <a:effectRef idx="0">
+            <a:schemeClr val="accent1"/>
+          </a:effectRef>
+          <a:fontRef idx="minor">
+            <a:schemeClr val="lt1"/>
+          </a:fontRef>
+        </p:style>
+        <p:txBody>
+          <a:bodyPr rtlCol="1" anchor="ctr"/>
+          <a:lstStyle/>
+          <a:p>
+            <a:pPr algn="ctr"/>
+            <a:r>
+              <a:rPr lang="en-US" dirty="0"/>
+              <a:t>3</a:t>
+            </a:r>
+            <a:endParaRPr lang="he-IL" dirty="0"/>
+          </a:p>
+        </p:txBody>
+      </p:sp>
+      <p:sp>
+        <p:nvSpPr>
+          <p:cNvPr id="7" name="מלבן 6">
+            <a:extLst>
+              <a:ext uri="{FF2B5EF4-FFF2-40B4-BE49-F238E27FC236}">
+                <a16:creationId xmlns:a16="http://schemas.microsoft.com/office/drawing/2014/main" id="{F0ABFF77-13DA-F61E-0344-8DDBE08B2D71}"/>
+              </a:ext>
+            </a:extLst>
+          </p:cNvPr>
+          <p:cNvSpPr/>
+          <p:nvPr/>
+        </p:nvSpPr>
+        <p:spPr>
+          <a:xfrm>
+            <a:off x="8485918" y="1444901"/>
+            <a:ext cx="228600" cy="301752"/>
+          </a:xfrm>
+          <a:prstGeom prst="rect">
+            <a:avLst/>
+          </a:prstGeom>
+        </p:spPr>
+        <p:style>
+          <a:lnRef idx="2">
+            <a:schemeClr val="accent1">
+              <a:shade val="15000"/>
+            </a:schemeClr>
+          </a:lnRef>
+          <a:fillRef idx="1">
+            <a:schemeClr val="accent1"/>
+          </a:fillRef>
+          <a:effectRef idx="0">
+            <a:schemeClr val="accent1"/>
+          </a:effectRef>
+          <a:fontRef idx="minor">
+            <a:schemeClr val="lt1"/>
+          </a:fontRef>
+        </p:style>
+        <p:txBody>
+          <a:bodyPr rtlCol="1" anchor="ctr"/>
+          <a:lstStyle/>
+          <a:p>
+            <a:pPr algn="ctr"/>
+            <a:r>
+              <a:rPr lang="en-US" dirty="0"/>
+              <a:t>4</a:t>
+            </a:r>
+            <a:endParaRPr lang="he-IL" dirty="0"/>
+          </a:p>
+        </p:txBody>
+      </p:sp>
+      <p:sp>
+        <p:nvSpPr>
+          <p:cNvPr id="8" name="מלבן 7">
+            <a:extLst>
+              <a:ext uri="{FF2B5EF4-FFF2-40B4-BE49-F238E27FC236}">
+                <a16:creationId xmlns:a16="http://schemas.microsoft.com/office/drawing/2014/main" id="{6F6497CF-2735-FB15-A15C-A591C07D5251}"/>
+              </a:ext>
+            </a:extLst>
+          </p:cNvPr>
+          <p:cNvSpPr/>
+          <p:nvPr/>
+        </p:nvSpPr>
+        <p:spPr>
+          <a:xfrm>
+            <a:off x="10847658" y="1444901"/>
+            <a:ext cx="228600" cy="301752"/>
+          </a:xfrm>
+          <a:prstGeom prst="rect">
+            <a:avLst/>
+          </a:prstGeom>
+        </p:spPr>
+        <p:style>
+          <a:lnRef idx="2">
+            <a:schemeClr val="accent1">
+              <a:shade val="15000"/>
+            </a:schemeClr>
+          </a:lnRef>
+          <a:fillRef idx="1">
+            <a:schemeClr val="accent1"/>
+          </a:fillRef>
+          <a:effectRef idx="0">
+            <a:schemeClr val="accent1"/>
+          </a:effectRef>
+          <a:fontRef idx="minor">
+            <a:schemeClr val="lt1"/>
+          </a:fontRef>
+        </p:style>
+        <p:txBody>
+          <a:bodyPr rtlCol="1" anchor="ctr"/>
+          <a:lstStyle/>
+          <a:p>
+            <a:pPr algn="ctr"/>
+            <a:r>
+              <a:rPr lang="en-US" dirty="0"/>
+              <a:t>5</a:t>
+            </a:r>
+            <a:endParaRPr lang="he-IL" dirty="0"/>
+          </a:p>
+        </p:txBody>
+      </p:sp>
+      <p:sp>
+        <p:nvSpPr>
+          <p:cNvPr id="9" name="מלבן 8">
+            <a:extLst>
+              <a:ext uri="{FF2B5EF4-FFF2-40B4-BE49-F238E27FC236}">
+                <a16:creationId xmlns:a16="http://schemas.microsoft.com/office/drawing/2014/main" id="{8DA39E28-CE7D-F965-E357-6232F3183047}"/>
+              </a:ext>
+            </a:extLst>
+          </p:cNvPr>
+          <p:cNvSpPr/>
+          <p:nvPr/>
+        </p:nvSpPr>
+        <p:spPr>
+          <a:xfrm>
+            <a:off x="1157478" y="2185565"/>
+            <a:ext cx="228600" cy="301752"/>
+          </a:xfrm>
+          <a:prstGeom prst="rect">
+            <a:avLst/>
+          </a:prstGeom>
+        </p:spPr>
+        <p:style>
+          <a:lnRef idx="2">
+            <a:schemeClr val="accent1">
+              <a:shade val="15000"/>
+            </a:schemeClr>
+          </a:lnRef>
+          <a:fillRef idx="1">
+            <a:schemeClr val="accent1"/>
+          </a:fillRef>
+          <a:effectRef idx="0">
+            <a:schemeClr val="accent1"/>
+          </a:effectRef>
+          <a:fontRef idx="minor">
+            <a:schemeClr val="lt1"/>
+          </a:fontRef>
+        </p:style>
+        <p:txBody>
+          <a:bodyPr rtlCol="1" anchor="ctr"/>
+          <a:lstStyle/>
+          <a:p>
+            <a:pPr algn="ctr"/>
+            <a:r>
+              <a:rPr lang="en-US" dirty="0"/>
+              <a:t>2</a:t>
+            </a:r>
+            <a:endParaRPr lang="he-IL" dirty="0"/>
+          </a:p>
+        </p:txBody>
+      </p:sp>
+      <p:sp>
+        <p:nvSpPr>
+          <p:cNvPr id="10" name="מלבן 9">
+            <a:extLst>
+              <a:ext uri="{FF2B5EF4-FFF2-40B4-BE49-F238E27FC236}">
+                <a16:creationId xmlns:a16="http://schemas.microsoft.com/office/drawing/2014/main" id="{862DF2B1-72C9-E0C1-95AC-8996C24C8546}"/>
+              </a:ext>
+            </a:extLst>
+          </p:cNvPr>
+          <p:cNvSpPr/>
+          <p:nvPr/>
+        </p:nvSpPr>
+        <p:spPr>
+          <a:xfrm>
+            <a:off x="1157478" y="2688485"/>
+            <a:ext cx="228600" cy="301752"/>
+          </a:xfrm>
+          <a:prstGeom prst="rect">
+            <a:avLst/>
+          </a:prstGeom>
+        </p:spPr>
+        <p:style>
+          <a:lnRef idx="2">
+            <a:schemeClr val="accent1">
+              <a:shade val="15000"/>
+            </a:schemeClr>
+          </a:lnRef>
+          <a:fillRef idx="1">
+            <a:schemeClr val="accent1"/>
+          </a:fillRef>
+          <a:effectRef idx="0">
+            <a:schemeClr val="accent1"/>
+          </a:effectRef>
+          <a:fontRef idx="minor">
+            <a:schemeClr val="lt1"/>
+          </a:fontRef>
+        </p:style>
+        <p:txBody>
+          <a:bodyPr rtlCol="1" anchor="ctr"/>
+          <a:lstStyle/>
+          <a:p>
+            <a:pPr algn="ctr"/>
+            <a:r>
+              <a:rPr lang="en-US" dirty="0"/>
+              <a:t>3</a:t>
+            </a:r>
+            <a:endParaRPr lang="he-IL" dirty="0"/>
+          </a:p>
+        </p:txBody>
+      </p:sp>
+      <p:sp>
+        <p:nvSpPr>
+          <p:cNvPr id="11" name="מלבן 10">
+            <a:extLst>
+              <a:ext uri="{FF2B5EF4-FFF2-40B4-BE49-F238E27FC236}">
+                <a16:creationId xmlns:a16="http://schemas.microsoft.com/office/drawing/2014/main" id="{65EE8FA3-0F5D-3364-4AAD-C5E3BF9BC887}"/>
+              </a:ext>
+            </a:extLst>
+          </p:cNvPr>
+          <p:cNvSpPr/>
+          <p:nvPr/>
+        </p:nvSpPr>
+        <p:spPr>
+          <a:xfrm>
+            <a:off x="1157478" y="3191405"/>
+            <a:ext cx="228600" cy="301752"/>
+          </a:xfrm>
+          <a:prstGeom prst="rect">
+            <a:avLst/>
+          </a:prstGeom>
+        </p:spPr>
+        <p:style>
+          <a:lnRef idx="2">
+            <a:schemeClr val="accent1">
+              <a:shade val="15000"/>
+            </a:schemeClr>
+          </a:lnRef>
+          <a:fillRef idx="1">
+            <a:schemeClr val="accent1"/>
+          </a:fillRef>
+          <a:effectRef idx="0">
+            <a:schemeClr val="accent1"/>
+          </a:effectRef>
+          <a:fontRef idx="minor">
+            <a:schemeClr val="lt1"/>
+          </a:fontRef>
+        </p:style>
+        <p:txBody>
+          <a:bodyPr rtlCol="1" anchor="ctr"/>
+          <a:lstStyle/>
+          <a:p>
+            <a:pPr algn="ctr"/>
+            <a:r>
+              <a:rPr lang="en-US" dirty="0"/>
+              <a:t>4</a:t>
+            </a:r>
+            <a:endParaRPr lang="he-IL" dirty="0"/>
+          </a:p>
+        </p:txBody>
+      </p:sp>
+      <p:sp>
+        <p:nvSpPr>
+          <p:cNvPr id="12" name="מלבן 11">
+            <a:extLst>
+              <a:ext uri="{FF2B5EF4-FFF2-40B4-BE49-F238E27FC236}">
+                <a16:creationId xmlns:a16="http://schemas.microsoft.com/office/drawing/2014/main" id="{9D3E6649-802B-72C8-8BD6-00D79DBC058D}"/>
+              </a:ext>
+            </a:extLst>
+          </p:cNvPr>
+          <p:cNvSpPr/>
+          <p:nvPr/>
+        </p:nvSpPr>
+        <p:spPr>
+          <a:xfrm>
+            <a:off x="1157478" y="3692037"/>
+            <a:ext cx="228600" cy="301752"/>
+          </a:xfrm>
+          <a:prstGeom prst="rect">
+            <a:avLst/>
+          </a:prstGeom>
+        </p:spPr>
+        <p:style>
+          <a:lnRef idx="2">
+            <a:schemeClr val="accent1">
+              <a:shade val="15000"/>
+            </a:schemeClr>
+          </a:lnRef>
+          <a:fillRef idx="1">
+            <a:schemeClr val="accent1"/>
+          </a:fillRef>
+          <a:effectRef idx="0">
+            <a:schemeClr val="accent1"/>
+          </a:effectRef>
+          <a:fontRef idx="minor">
+            <a:schemeClr val="lt1"/>
+          </a:fontRef>
+        </p:style>
+        <p:txBody>
+          <a:bodyPr rtlCol="1" anchor="ctr"/>
+          <a:lstStyle/>
+          <a:p>
+            <a:pPr algn="ctr"/>
+            <a:r>
+              <a:rPr lang="en-US" dirty="0"/>
+              <a:t>5</a:t>
+            </a:r>
+            <a:endParaRPr lang="he-IL" dirty="0"/>
+          </a:p>
+        </p:txBody>
+      </p:sp>
+      <p:sp>
+        <p:nvSpPr>
+          <p:cNvPr id="13" name="מלבן 12">
+            <a:extLst>
+              <a:ext uri="{FF2B5EF4-FFF2-40B4-BE49-F238E27FC236}">
+                <a16:creationId xmlns:a16="http://schemas.microsoft.com/office/drawing/2014/main" id="{593DFC64-C03A-F0D1-ED15-72BC8C8CF57F}"/>
+              </a:ext>
+            </a:extLst>
+          </p:cNvPr>
+          <p:cNvSpPr/>
+          <p:nvPr/>
+        </p:nvSpPr>
+        <p:spPr>
+          <a:xfrm>
+            <a:off x="1149096" y="4192669"/>
+            <a:ext cx="228600" cy="301752"/>
+          </a:xfrm>
+          <a:prstGeom prst="rect">
+            <a:avLst/>
+          </a:prstGeom>
+        </p:spPr>
+        <p:style>
+          <a:lnRef idx="2">
+            <a:schemeClr val="accent1">
+              <a:shade val="15000"/>
+            </a:schemeClr>
+          </a:lnRef>
+          <a:fillRef idx="1">
+            <a:schemeClr val="accent1"/>
+          </a:fillRef>
+          <a:effectRef idx="0">
+            <a:schemeClr val="accent1"/>
+          </a:effectRef>
+          <a:fontRef idx="minor">
+            <a:schemeClr val="lt1"/>
+          </a:fontRef>
+        </p:style>
+        <p:txBody>
+          <a:bodyPr rtlCol="1" anchor="ctr"/>
+          <a:lstStyle/>
+          <a:p>
+            <a:pPr algn="ctr"/>
+            <a:r>
+              <a:rPr lang="en-US" dirty="0"/>
+              <a:t>6</a:t>
+            </a:r>
+            <a:endParaRPr lang="he-IL" dirty="0"/>
+          </a:p>
+        </p:txBody>
+      </p:sp>
+      <p:sp>
+        <p:nvSpPr>
+          <p:cNvPr id="14" name="מלבן 13">
+            <a:extLst>
+              <a:ext uri="{FF2B5EF4-FFF2-40B4-BE49-F238E27FC236}">
+                <a16:creationId xmlns:a16="http://schemas.microsoft.com/office/drawing/2014/main" id="{89EFD384-3FCA-6B9A-3BEE-F8D0BFA562CA}"/>
+              </a:ext>
+            </a:extLst>
+          </p:cNvPr>
+          <p:cNvSpPr/>
+          <p:nvPr/>
+        </p:nvSpPr>
+        <p:spPr>
+          <a:xfrm>
+            <a:off x="1157478" y="4636298"/>
+            <a:ext cx="228600" cy="301752"/>
+          </a:xfrm>
+          <a:prstGeom prst="rect">
+            <a:avLst/>
+          </a:prstGeom>
+        </p:spPr>
+        <p:style>
+          <a:lnRef idx="2">
+            <a:schemeClr val="accent1">
+              <a:shade val="15000"/>
+            </a:schemeClr>
+          </a:lnRef>
+          <a:fillRef idx="1">
+            <a:schemeClr val="accent1"/>
+          </a:fillRef>
+          <a:effectRef idx="0">
+            <a:schemeClr val="accent1"/>
+          </a:effectRef>
+          <a:fontRef idx="minor">
+            <a:schemeClr val="lt1"/>
+          </a:fontRef>
+        </p:style>
+        <p:txBody>
+          <a:bodyPr rtlCol="1" anchor="ctr"/>
+          <a:lstStyle/>
+          <a:p>
+            <a:pPr algn="ctr"/>
+            <a:r>
+              <a:rPr lang="en-US" dirty="0"/>
+              <a:t>7</a:t>
+            </a:r>
+            <a:endParaRPr lang="he-IL" dirty="0"/>
+          </a:p>
+        </p:txBody>
+      </p:sp>
+      <p:sp>
+        <p:nvSpPr>
+          <p:cNvPr id="15" name="מלבן 14">
+            <a:extLst>
+              <a:ext uri="{FF2B5EF4-FFF2-40B4-BE49-F238E27FC236}">
+                <a16:creationId xmlns:a16="http://schemas.microsoft.com/office/drawing/2014/main" id="{2E835EA0-1BEB-9FA8-65E1-FD919734A9C5}"/>
+              </a:ext>
+            </a:extLst>
+          </p:cNvPr>
+          <p:cNvSpPr/>
+          <p:nvPr/>
+        </p:nvSpPr>
+        <p:spPr>
+          <a:xfrm>
+            <a:off x="1157478" y="5111347"/>
+            <a:ext cx="228600" cy="301752"/>
+          </a:xfrm>
+          <a:prstGeom prst="rect">
+            <a:avLst/>
+          </a:prstGeom>
+        </p:spPr>
+        <p:style>
+          <a:lnRef idx="2">
+            <a:schemeClr val="accent1">
+              <a:shade val="15000"/>
+            </a:schemeClr>
+          </a:lnRef>
+          <a:fillRef idx="1">
+            <a:schemeClr val="accent1"/>
+          </a:fillRef>
+          <a:effectRef idx="0">
+            <a:schemeClr val="accent1"/>
+          </a:effectRef>
+          <a:fontRef idx="minor">
+            <a:schemeClr val="lt1"/>
+          </a:fontRef>
+        </p:style>
+        <p:txBody>
+          <a:bodyPr rtlCol="1" anchor="ctr"/>
+          <a:lstStyle/>
+          <a:p>
+            <a:pPr algn="ctr"/>
+            <a:r>
+              <a:rPr lang="en-US" dirty="0"/>
+              <a:t>8</a:t>
+            </a:r>
+            <a:endParaRPr lang="he-IL" dirty="0"/>
+          </a:p>
+        </p:txBody>
+      </p:sp>
+      <p:sp>
+        <p:nvSpPr>
+          <p:cNvPr id="16" name="מלבן 15">
+            <a:extLst>
+              <a:ext uri="{FF2B5EF4-FFF2-40B4-BE49-F238E27FC236}">
+                <a16:creationId xmlns:a16="http://schemas.microsoft.com/office/drawing/2014/main" id="{4EDF2436-34CA-17DF-2C27-002D1F4B9989}"/>
+              </a:ext>
+            </a:extLst>
+          </p:cNvPr>
+          <p:cNvSpPr/>
+          <p:nvPr/>
+        </p:nvSpPr>
+        <p:spPr>
+          <a:xfrm>
+            <a:off x="1157478" y="5660128"/>
+            <a:ext cx="228600" cy="301752"/>
+          </a:xfrm>
+          <a:prstGeom prst="rect">
+            <a:avLst/>
+          </a:prstGeom>
+        </p:spPr>
+        <p:style>
+          <a:lnRef idx="2">
+            <a:schemeClr val="accent1">
+              <a:shade val="15000"/>
+            </a:schemeClr>
+          </a:lnRef>
+          <a:fillRef idx="1">
+            <a:schemeClr val="accent1"/>
+          </a:fillRef>
+          <a:effectRef idx="0">
+            <a:schemeClr val="accent1"/>
+          </a:effectRef>
+          <a:fontRef idx="minor">
+            <a:schemeClr val="lt1"/>
+          </a:fontRef>
+        </p:style>
+        <p:txBody>
+          <a:bodyPr rtlCol="1" anchor="ctr"/>
+          <a:lstStyle/>
+          <a:p>
+            <a:pPr algn="ctr"/>
+            <a:r>
+              <a:rPr lang="en-US" dirty="0"/>
+              <a:t>9</a:t>
+            </a:r>
+            <a:endParaRPr lang="he-IL" dirty="0"/>
+          </a:p>
+        </p:txBody>
+      </p:sp>
     </p:spTree>
     <p:extLst>
       <p:ext uri="{BB962C8B-B14F-4D97-AF65-F5344CB8AC3E}">

</xml_diff>